<commit_message>
First editing pass; much content removed (notes in SIM)
</commit_message>
<xml_diff>
--- a/docs/deployment_guide/images/Quickstart_tibero.pptx
+++ b/docs/deployment_guide/images/Quickstart_tibero.pptx
@@ -5,10 +5,11 @@
     <p:sldMasterId id="2147483659" r:id="rId1"/>
   </p:sldMasterIdLst>
   <p:notesMasterIdLst>
-    <p:notesMasterId r:id="rId3"/>
+    <p:notesMasterId r:id="rId4"/>
   </p:notesMasterIdLst>
   <p:sldIdLst>
-    <p:sldId id="264" r:id="rId2"/>
+    <p:sldId id="265" r:id="rId2"/>
+    <p:sldId id="264" r:id="rId3"/>
   </p:sldIdLst>
   <p:sldSz cx="9144000" cy="5143500" type="screen16x9"/>
   <p:notesSz cx="6858000" cy="9144000"/>
@@ -242,6 +243,20 @@
     </a:lvl9pPr>
   </p:defaultTextStyle>
   <p:extLst>
+    <p:ext uri="{521415D9-36F7-43E2-AB2F-B90AF26B5E84}">
+      <p14:sectionLst xmlns:p14="http://schemas.microsoft.com/office/powerpoint/2010/main">
+        <p14:section name="Use this diagram" id="{35E14503-EB22-4230-BC81-D87792B6A9DD}">
+          <p14:sldIdLst>
+            <p14:sldId id="265"/>
+          </p14:sldIdLst>
+        </p14:section>
+        <p14:section name="ORIGINAL (Do not use)" id="{48804C2A-6665-4590-A6FE-CE46BDCE7575}">
+          <p14:sldIdLst>
+            <p14:sldId id="264"/>
+          </p14:sldIdLst>
+        </p14:section>
+      </p14:sectionLst>
+    </p:ext>
     <p:ext uri="{EFAFB233-063F-42B5-8137-9DF3F51BA10A}">
       <p15:sldGuideLst xmlns:p15="http://schemas.microsoft.com/office/powerpoint/2012/main">
         <p15:guide id="1" orient="horz" pos="1620">
@@ -793,7 +808,111 @@
               </a:spcAft>
               <a:buNone/>
             </a:pPr>
-            <a:endParaRPr/>
+            <a:endParaRPr dirty="0"/>
+          </a:p>
+        </p:txBody>
+      </p:sp>
+    </p:spTree>
+  </p:cSld>
+  <p:clrMapOvr>
+    <a:masterClrMapping/>
+  </p:clrMapOvr>
+</p:notes>
+</file>
+
+<file path=ppt/notesSlides/notesSlide2.xml><?xml version="1.0" encoding="utf-8"?>
+<p:notes xmlns:a="http://schemas.openxmlformats.org/drawingml/2006/main" xmlns:r="http://schemas.openxmlformats.org/officeDocument/2006/relationships" xmlns:p="http://schemas.openxmlformats.org/presentationml/2006/main" showMasterSp="0" showMasterPhAnim="0">
+  <p:cSld>
+    <p:spTree>
+      <p:nvGrpSpPr>
+        <p:cNvPr id="1" name="Shape 457"/>
+        <p:cNvGrpSpPr/>
+        <p:nvPr/>
+      </p:nvGrpSpPr>
+      <p:grpSpPr>
+        <a:xfrm>
+          <a:off x="0" y="0"/>
+          <a:ext cx="0" cy="0"/>
+          <a:chOff x="0" y="0"/>
+          <a:chExt cx="0" cy="0"/>
+        </a:xfrm>
+      </p:grpSpPr>
+      <p:sp>
+        <p:nvSpPr>
+          <p:cNvPr id="458" name="Google Shape;458;gd4e94c6c5a_0_0:notes"/>
+          <p:cNvSpPr>
+            <a:spLocks noGrp="1" noRot="1" noChangeAspect="1"/>
+          </p:cNvSpPr>
+          <p:nvPr>
+            <p:ph type="sldImg" idx="2"/>
+          </p:nvPr>
+        </p:nvSpPr>
+        <p:spPr>
+          <a:xfrm>
+            <a:off x="381000" y="685800"/>
+            <a:ext cx="6096000" cy="3429000"/>
+          </a:xfrm>
+          <a:custGeom>
+            <a:avLst/>
+            <a:gdLst/>
+            <a:ahLst/>
+            <a:cxnLst/>
+            <a:rect l="l" t="t" r="r" b="b"/>
+            <a:pathLst>
+              <a:path w="120000" h="120000" extrusionOk="0">
+                <a:moveTo>
+                  <a:pt x="0" y="0"/>
+                </a:moveTo>
+                <a:lnTo>
+                  <a:pt x="120000" y="0"/>
+                </a:lnTo>
+                <a:lnTo>
+                  <a:pt x="120000" y="120000"/>
+                </a:lnTo>
+                <a:lnTo>
+                  <a:pt x="0" y="120000"/>
+                </a:lnTo>
+                <a:close/>
+              </a:path>
+            </a:pathLst>
+          </a:custGeom>
+        </p:spPr>
+      </p:sp>
+      <p:sp>
+        <p:nvSpPr>
+          <p:cNvPr id="459" name="Google Shape;459;gd4e94c6c5a_0_0:notes"/>
+          <p:cNvSpPr txBox="1">
+            <a:spLocks noGrp="1"/>
+          </p:cNvSpPr>
+          <p:nvPr>
+            <p:ph type="body" idx="1"/>
+          </p:nvPr>
+        </p:nvSpPr>
+        <p:spPr>
+          <a:xfrm>
+            <a:off x="685800" y="4343400"/>
+            <a:ext cx="5486400" cy="4114800"/>
+          </a:xfrm>
+          <a:prstGeom prst="rect">
+            <a:avLst/>
+          </a:prstGeom>
+        </p:spPr>
+        <p:txBody>
+          <a:bodyPr spcFirstLastPara="1" wrap="square" lIns="91425" tIns="91425" rIns="91425" bIns="91425" anchor="t" anchorCtr="0">
+            <a:noAutofit/>
+          </a:bodyPr>
+          <a:lstStyle/>
+          <a:p>
+            <a:pPr marL="0" lvl="0" indent="0" algn="l" rtl="0">
+              <a:spcBef>
+                <a:spcPts val="0"/>
+              </a:spcBef>
+              <a:spcAft>
+                <a:spcPts val="0"/>
+              </a:spcAft>
+              <a:buNone/>
+            </a:pPr>
+            <a:endParaRPr dirty="0"/>
           </a:p>
         </p:txBody>
       </p:sp>
@@ -1182,7 +1301,7 @@
               <a:rPr lang="ko"/>
               <a:t>‹#›</a:t>
             </a:fld>
-            <a:endParaRPr/>
+            <a:endParaRPr dirty="0"/>
           </a:p>
         </p:txBody>
       </p:sp>
@@ -1546,7 +1665,7 @@
               <a:rPr lang="ko"/>
               <a:t>‹#›</a:t>
             </a:fld>
-            <a:endParaRPr/>
+            <a:endParaRPr dirty="0"/>
           </a:p>
         </p:txBody>
       </p:sp>
@@ -1650,7 +1769,7 @@
               <a:rPr lang="ko"/>
               <a:t>‹#›</a:t>
             </a:fld>
-            <a:endParaRPr/>
+            <a:endParaRPr dirty="0"/>
           </a:p>
         </p:txBody>
       </p:sp>
@@ -1883,7 +2002,7 @@
               <a:rPr lang="ko"/>
               <a:t>‹#›</a:t>
             </a:fld>
-            <a:endParaRPr/>
+            <a:endParaRPr dirty="0"/>
           </a:p>
         </p:txBody>
       </p:sp>
@@ -2245,7 +2364,7 @@
               <a:rPr lang="ko"/>
               <a:t>‹#›</a:t>
             </a:fld>
-            <a:endParaRPr/>
+            <a:endParaRPr dirty="0"/>
           </a:p>
         </p:txBody>
       </p:sp>
@@ -2736,7 +2855,7 @@
               <a:rPr lang="ko"/>
               <a:t>‹#›</a:t>
             </a:fld>
-            <a:endParaRPr/>
+            <a:endParaRPr dirty="0"/>
           </a:p>
         </p:txBody>
       </p:sp>
@@ -2969,7 +3088,7 @@
               <a:rPr lang="ko"/>
               <a:t>‹#›</a:t>
             </a:fld>
-            <a:endParaRPr/>
+            <a:endParaRPr dirty="0"/>
           </a:p>
         </p:txBody>
       </p:sp>
@@ -3331,7 +3450,7 @@
               <a:rPr lang="ko"/>
               <a:t>‹#›</a:t>
             </a:fld>
-            <a:endParaRPr/>
+            <a:endParaRPr dirty="0"/>
           </a:p>
         </p:txBody>
       </p:sp>
@@ -3564,7 +3683,7 @@
               <a:rPr lang="ko"/>
               <a:t>‹#›</a:t>
             </a:fld>
-            <a:endParaRPr/>
+            <a:endParaRPr dirty="0"/>
           </a:p>
         </p:txBody>
       </p:sp>
@@ -3629,7 +3748,7 @@
               </a:spcAft>
               <a:buNone/>
             </a:pPr>
-            <a:endParaRPr/>
+            <a:endParaRPr dirty="0"/>
           </a:p>
         </p:txBody>
       </p:sp>
@@ -4122,7 +4241,7 @@
               <a:rPr lang="ko"/>
               <a:t>‹#›</a:t>
             </a:fld>
-            <a:endParaRPr/>
+            <a:endParaRPr dirty="0"/>
           </a:p>
         </p:txBody>
       </p:sp>
@@ -4270,7 +4389,7 @@
               <a:rPr lang="ko"/>
               <a:t>‹#›</a:t>
             </a:fld>
-            <a:endParaRPr/>
+            <a:endParaRPr dirty="0"/>
           </a:p>
         </p:txBody>
       </p:sp>
@@ -4841,7 +4960,7 @@
               <a:rPr lang="ko"/>
               <a:t>‹#›</a:t>
             </a:fld>
-            <a:endParaRPr/>
+            <a:endParaRPr dirty="0"/>
           </a:p>
         </p:txBody>
       </p:sp>
@@ -5580,7 +5699,7 @@
         <p:spPr>
           <a:xfrm>
             <a:off x="207875" y="268250"/>
-            <a:ext cx="8845200" cy="4682400"/>
+            <a:ext cx="8688220" cy="4682400"/>
           </a:xfrm>
           <a:prstGeom prst="rect">
             <a:avLst/>
@@ -5612,7 +5731,7 @@
               <a:buNone/>
             </a:pPr>
             <a:r>
-              <a:rPr lang="ko" sz="1000" b="0" i="0" u="none" strike="noStrike" cap="none">
+              <a:rPr lang="ko" sz="1200" b="0" i="0" u="none" strike="noStrike" cap="none" dirty="0">
                 <a:solidFill>
                   <a:srgbClr val="000000"/>
                 </a:solidFill>
@@ -5623,7 +5742,7 @@
               </a:rPr>
               <a:t>AWS Cloud</a:t>
             </a:r>
-            <a:endParaRPr sz="1300"/>
+            <a:endParaRPr sz="1200" dirty="0"/>
           </a:p>
         </p:txBody>
       </p:sp>
@@ -5635,8 +5754,8 @@
         </p:nvSpPr>
         <p:spPr>
           <a:xfrm>
-            <a:off x="1172028" y="1274150"/>
-            <a:ext cx="7722000" cy="3552300"/>
+            <a:off x="290286" y="936445"/>
+            <a:ext cx="7351486" cy="3873448"/>
           </a:xfrm>
           <a:prstGeom prst="rect">
             <a:avLst/>
@@ -5668,7 +5787,7 @@
               <a:buNone/>
             </a:pPr>
             <a:r>
-              <a:rPr lang="ko" sz="1000" b="0" i="0" u="none" strike="noStrike" cap="none">
+              <a:rPr lang="ko" sz="1200" b="0" i="0" u="none" strike="noStrike" cap="none" dirty="0">
                 <a:solidFill>
                   <a:srgbClr val="1E8900"/>
                 </a:solidFill>
@@ -5679,7 +5798,7 @@
               </a:rPr>
               <a:t>VPC</a:t>
             </a:r>
-            <a:endParaRPr sz="1200"/>
+            <a:endParaRPr sz="1200" dirty="0"/>
           </a:p>
         </p:txBody>
       </p:sp>
@@ -5691,8 +5810,8 @@
         </p:nvSpPr>
         <p:spPr>
           <a:xfrm>
-            <a:off x="1307803" y="1704550"/>
-            <a:ext cx="2329200" cy="2982900"/>
+            <a:off x="654667" y="620486"/>
+            <a:ext cx="1773936" cy="4254764"/>
           </a:xfrm>
           <a:prstGeom prst="rect">
             <a:avLst/>
@@ -5724,7 +5843,7 @@
               <a:buNone/>
             </a:pPr>
             <a:r>
-              <a:rPr lang="ko" sz="1000" b="0" i="0" u="none" strike="noStrike" cap="none">
+              <a:rPr lang="ko" sz="1200" b="0" i="0" u="none" strike="noStrike" cap="none" dirty="0">
                 <a:solidFill>
                   <a:srgbClr val="5B9CD5"/>
                 </a:solidFill>
@@ -5735,7 +5854,7 @@
               </a:rPr>
               <a:t>Availability Zone 1</a:t>
             </a:r>
-            <a:endParaRPr sz="1000"/>
+            <a:endParaRPr sz="1200" dirty="0"/>
           </a:p>
         </p:txBody>
       </p:sp>
@@ -5774,8 +5893,8 @@
         </p:nvSpPr>
         <p:spPr>
           <a:xfrm>
-            <a:off x="1443905" y="2088250"/>
-            <a:ext cx="2077200" cy="1173600"/>
+            <a:off x="790769" y="1288358"/>
+            <a:ext cx="1558940" cy="1823141"/>
           </a:xfrm>
           <a:prstGeom prst="rect">
             <a:avLst/>
@@ -5805,7 +5924,7 @@
               <a:buNone/>
             </a:pPr>
             <a:r>
-              <a:rPr lang="ko" sz="1000" b="0" i="0" u="none" strike="noStrike" cap="none">
+              <a:rPr lang="ko" sz="1200" b="0" i="0" u="none" strike="noStrike" cap="none" dirty="0">
                 <a:solidFill>
                   <a:srgbClr val="1E8900"/>
                 </a:solidFill>
@@ -5816,7 +5935,2869 @@
               </a:rPr>
               <a:t>Public subnet</a:t>
             </a:r>
-            <a:endParaRPr sz="1200"/>
+            <a:endParaRPr sz="1200" dirty="0"/>
+          </a:p>
+        </p:txBody>
+      </p:sp>
+      <p:pic>
+        <p:nvPicPr>
+          <p:cNvPr id="466" name="Google Shape;466;p21"/>
+          <p:cNvPicPr preferRelativeResize="0"/>
+          <p:nvPr/>
+        </p:nvPicPr>
+        <p:blipFill rotWithShape="1">
+          <a:blip r:embed="rId4">
+            <a:alphaModFix/>
+          </a:blip>
+          <a:srcRect/>
+          <a:stretch/>
+        </p:blipFill>
+        <p:spPr>
+          <a:xfrm>
+            <a:off x="796804" y="1288359"/>
+            <a:ext cx="274638" cy="274638"/>
+          </a:xfrm>
+          <a:prstGeom prst="rect">
+            <a:avLst/>
+          </a:prstGeom>
+          <a:noFill/>
+          <a:ln>
+            <a:noFill/>
+          </a:ln>
+        </p:spPr>
+      </p:pic>
+      <p:sp>
+        <p:nvSpPr>
+          <p:cNvPr id="467" name="Google Shape;467;p21"/>
+          <p:cNvSpPr/>
+          <p:nvPr/>
+        </p:nvSpPr>
+        <p:spPr>
+          <a:xfrm>
+            <a:off x="787141" y="3208171"/>
+            <a:ext cx="1563624" cy="1540390"/>
+          </a:xfrm>
+          <a:prstGeom prst="rect">
+            <a:avLst/>
+          </a:prstGeom>
+          <a:solidFill>
+            <a:srgbClr val="007CBC">
+              <a:alpha val="9800"/>
+            </a:srgbClr>
+          </a:solidFill>
+          <a:ln>
+            <a:noFill/>
+          </a:ln>
+        </p:spPr>
+        <p:txBody>
+          <a:bodyPr spcFirstLastPara="1" wrap="square" lIns="338325" tIns="45700" rIns="91425" bIns="45700" anchor="t" anchorCtr="0">
+            <a:noAutofit/>
+          </a:bodyPr>
+          <a:lstStyle/>
+          <a:p>
+            <a:pPr marL="0" marR="0" lvl="0" indent="0" algn="l" rtl="0">
+              <a:spcBef>
+                <a:spcPts val="0"/>
+              </a:spcBef>
+              <a:spcAft>
+                <a:spcPts val="0"/>
+              </a:spcAft>
+              <a:buNone/>
+            </a:pPr>
+            <a:r>
+              <a:rPr lang="ko" sz="1200" b="0" i="0" u="none" strike="noStrike" cap="none" dirty="0">
+                <a:solidFill>
+                  <a:srgbClr val="5B9CD5"/>
+                </a:solidFill>
+                <a:latin typeface="Arial"/>
+                <a:ea typeface="Arial"/>
+                <a:cs typeface="Arial"/>
+                <a:sym typeface="Arial"/>
+              </a:rPr>
+              <a:t>Private subnet</a:t>
+            </a:r>
+            <a:endParaRPr sz="1200" dirty="0"/>
+          </a:p>
+        </p:txBody>
+      </p:sp>
+      <p:pic>
+        <p:nvPicPr>
+          <p:cNvPr id="468" name="Google Shape;468;p21"/>
+          <p:cNvPicPr preferRelativeResize="0"/>
+          <p:nvPr/>
+        </p:nvPicPr>
+        <p:blipFill rotWithShape="1">
+          <a:blip r:embed="rId5">
+            <a:alphaModFix/>
+          </a:blip>
+          <a:srcRect/>
+          <a:stretch/>
+        </p:blipFill>
+        <p:spPr>
+          <a:xfrm>
+            <a:off x="793656" y="3207922"/>
+            <a:ext cx="274637" cy="274638"/>
+          </a:xfrm>
+          <a:prstGeom prst="rect">
+            <a:avLst/>
+          </a:prstGeom>
+          <a:noFill/>
+          <a:ln>
+            <a:noFill/>
+          </a:ln>
+        </p:spPr>
+      </p:pic>
+      <p:pic>
+        <p:nvPicPr>
+          <p:cNvPr id="481" name="Google Shape;481;p21"/>
+          <p:cNvPicPr preferRelativeResize="0"/>
+          <p:nvPr/>
+        </p:nvPicPr>
+        <p:blipFill rotWithShape="1">
+          <a:blip r:embed="rId6">
+            <a:alphaModFix/>
+          </a:blip>
+          <a:srcRect/>
+          <a:stretch/>
+        </p:blipFill>
+        <p:spPr>
+          <a:xfrm>
+            <a:off x="291768" y="937535"/>
+            <a:ext cx="274625" cy="274625"/>
+          </a:xfrm>
+          <a:prstGeom prst="rect">
+            <a:avLst/>
+          </a:prstGeom>
+          <a:noFill/>
+          <a:ln>
+            <a:noFill/>
+          </a:ln>
+        </p:spPr>
+      </p:pic>
+      <p:sp>
+        <p:nvSpPr>
+          <p:cNvPr id="482" name="Google Shape;482;p21"/>
+          <p:cNvSpPr/>
+          <p:nvPr/>
+        </p:nvSpPr>
+        <p:spPr>
+          <a:xfrm>
+            <a:off x="3829031" y="620486"/>
+            <a:ext cx="1773794" cy="4254764"/>
+          </a:xfrm>
+          <a:prstGeom prst="rect">
+            <a:avLst/>
+          </a:prstGeom>
+          <a:noFill/>
+          <a:ln w="12700" cap="flat" cmpd="sng">
+            <a:solidFill>
+              <a:srgbClr val="5B9CD5"/>
+            </a:solidFill>
+            <a:prstDash val="dash"/>
+            <a:miter lim="800000"/>
+            <a:headEnd type="none" w="sm" len="sm"/>
+            <a:tailEnd type="none" w="sm" len="sm"/>
+          </a:ln>
+        </p:spPr>
+        <p:txBody>
+          <a:bodyPr spcFirstLastPara="1" wrap="square" lIns="91425" tIns="91425" rIns="91425" bIns="45700" anchor="t" anchorCtr="0">
+            <a:noAutofit/>
+          </a:bodyPr>
+          <a:lstStyle/>
+          <a:p>
+            <a:pPr marL="0" marR="0" lvl="0" indent="0" algn="ctr" rtl="0">
+              <a:spcBef>
+                <a:spcPts val="0"/>
+              </a:spcBef>
+              <a:spcAft>
+                <a:spcPts val="0"/>
+              </a:spcAft>
+              <a:buNone/>
+            </a:pPr>
+            <a:r>
+              <a:rPr lang="ko" sz="1200" b="0" i="0" u="none" strike="noStrike" cap="none" dirty="0">
+                <a:solidFill>
+                  <a:srgbClr val="5B9CD5"/>
+                </a:solidFill>
+                <a:latin typeface="Arial"/>
+                <a:ea typeface="Arial"/>
+                <a:cs typeface="Arial"/>
+                <a:sym typeface="Arial"/>
+              </a:rPr>
+              <a:t>Availability Zone </a:t>
+            </a:r>
+            <a:r>
+              <a:rPr lang="ko" sz="1200" dirty="0">
+                <a:solidFill>
+                  <a:srgbClr val="5B9CD5"/>
+                </a:solidFill>
+              </a:rPr>
+              <a:t>2</a:t>
+            </a:r>
+            <a:endParaRPr sz="1200" dirty="0"/>
+          </a:p>
+        </p:txBody>
+      </p:sp>
+      <p:sp>
+        <p:nvSpPr>
+          <p:cNvPr id="483" name="Google Shape;483;p21"/>
+          <p:cNvSpPr/>
+          <p:nvPr/>
+        </p:nvSpPr>
+        <p:spPr>
+          <a:xfrm>
+            <a:off x="3955106" y="1288358"/>
+            <a:ext cx="1563624" cy="1823141"/>
+          </a:xfrm>
+          <a:prstGeom prst="rect">
+            <a:avLst/>
+          </a:prstGeom>
+          <a:solidFill>
+            <a:srgbClr val="1D8900">
+              <a:alpha val="9800"/>
+            </a:srgbClr>
+          </a:solidFill>
+          <a:ln>
+            <a:noFill/>
+          </a:ln>
+        </p:spPr>
+        <p:txBody>
+          <a:bodyPr spcFirstLastPara="1" wrap="square" lIns="338325" tIns="45700" rIns="91425" bIns="45700" anchor="t" anchorCtr="0">
+            <a:noAutofit/>
+          </a:bodyPr>
+          <a:lstStyle/>
+          <a:p>
+            <a:pPr marL="0" marR="0" lvl="0" indent="0" algn="l" rtl="0">
+              <a:spcBef>
+                <a:spcPts val="0"/>
+              </a:spcBef>
+              <a:spcAft>
+                <a:spcPts val="0"/>
+              </a:spcAft>
+              <a:buNone/>
+            </a:pPr>
+            <a:r>
+              <a:rPr lang="ko" sz="1200" b="0" i="0" u="none" strike="noStrike" cap="none" dirty="0">
+                <a:solidFill>
+                  <a:srgbClr val="1E8900"/>
+                </a:solidFill>
+                <a:latin typeface="Arial"/>
+                <a:ea typeface="Arial"/>
+                <a:cs typeface="Arial"/>
+                <a:sym typeface="Arial"/>
+              </a:rPr>
+              <a:t>Public subnet</a:t>
+            </a:r>
+            <a:endParaRPr sz="1200" dirty="0"/>
+          </a:p>
+        </p:txBody>
+      </p:sp>
+      <p:pic>
+        <p:nvPicPr>
+          <p:cNvPr id="484" name="Google Shape;484;p21"/>
+          <p:cNvPicPr preferRelativeResize="0"/>
+          <p:nvPr/>
+        </p:nvPicPr>
+        <p:blipFill rotWithShape="1">
+          <a:blip r:embed="rId4">
+            <a:alphaModFix/>
+          </a:blip>
+          <a:srcRect/>
+          <a:stretch/>
+        </p:blipFill>
+        <p:spPr>
+          <a:xfrm>
+            <a:off x="3953665" y="1288359"/>
+            <a:ext cx="274638" cy="274638"/>
+          </a:xfrm>
+          <a:prstGeom prst="rect">
+            <a:avLst/>
+          </a:prstGeom>
+          <a:noFill/>
+          <a:ln>
+            <a:noFill/>
+          </a:ln>
+        </p:spPr>
+      </p:pic>
+      <p:sp>
+        <p:nvSpPr>
+          <p:cNvPr id="485" name="Google Shape;485;p21"/>
+          <p:cNvSpPr/>
+          <p:nvPr/>
+        </p:nvSpPr>
+        <p:spPr>
+          <a:xfrm>
+            <a:off x="3954519" y="3208171"/>
+            <a:ext cx="1563624" cy="1540390"/>
+          </a:xfrm>
+          <a:prstGeom prst="rect">
+            <a:avLst/>
+          </a:prstGeom>
+          <a:solidFill>
+            <a:srgbClr val="007CBC">
+              <a:alpha val="9800"/>
+            </a:srgbClr>
+          </a:solidFill>
+          <a:ln>
+            <a:noFill/>
+          </a:ln>
+        </p:spPr>
+        <p:txBody>
+          <a:bodyPr spcFirstLastPara="1" wrap="square" lIns="338325" tIns="45700" rIns="91425" bIns="45700" anchor="t" anchorCtr="0">
+            <a:noAutofit/>
+          </a:bodyPr>
+          <a:lstStyle/>
+          <a:p>
+            <a:pPr marL="0" marR="0" lvl="0" indent="0" algn="l" rtl="0">
+              <a:spcBef>
+                <a:spcPts val="0"/>
+              </a:spcBef>
+              <a:spcAft>
+                <a:spcPts val="0"/>
+              </a:spcAft>
+              <a:buNone/>
+            </a:pPr>
+            <a:r>
+              <a:rPr lang="ko" sz="1200" b="0" i="0" u="none" strike="noStrike" cap="none" dirty="0">
+                <a:solidFill>
+                  <a:srgbClr val="5B9CD5"/>
+                </a:solidFill>
+                <a:latin typeface="Arial"/>
+                <a:ea typeface="Arial"/>
+                <a:cs typeface="Arial"/>
+                <a:sym typeface="Arial"/>
+              </a:rPr>
+              <a:t>Private subnet</a:t>
+            </a:r>
+            <a:endParaRPr sz="1200" dirty="0"/>
+          </a:p>
+        </p:txBody>
+      </p:sp>
+      <p:pic>
+        <p:nvPicPr>
+          <p:cNvPr id="486" name="Google Shape;486;p21"/>
+          <p:cNvPicPr preferRelativeResize="0"/>
+          <p:nvPr/>
+        </p:nvPicPr>
+        <p:blipFill rotWithShape="1">
+          <a:blip r:embed="rId5">
+            <a:alphaModFix/>
+          </a:blip>
+          <a:srcRect/>
+          <a:stretch/>
+        </p:blipFill>
+        <p:spPr>
+          <a:xfrm>
+            <a:off x="3950147" y="3207922"/>
+            <a:ext cx="274637" cy="274638"/>
+          </a:xfrm>
+          <a:prstGeom prst="rect">
+            <a:avLst/>
+          </a:prstGeom>
+          <a:noFill/>
+          <a:ln>
+            <a:noFill/>
+          </a:ln>
+        </p:spPr>
+      </p:pic>
+      <p:sp>
+        <p:nvSpPr>
+          <p:cNvPr id="496" name="Google Shape;496;p21"/>
+          <p:cNvSpPr txBox="1"/>
+          <p:nvPr/>
+        </p:nvSpPr>
+        <p:spPr>
+          <a:xfrm>
+            <a:off x="953597" y="4009993"/>
+            <a:ext cx="1396112" cy="600124"/>
+          </a:xfrm>
+          <a:prstGeom prst="rect">
+            <a:avLst/>
+          </a:prstGeom>
+          <a:noFill/>
+          <a:ln>
+            <a:noFill/>
+          </a:ln>
+        </p:spPr>
+        <p:txBody>
+          <a:bodyPr spcFirstLastPara="1" wrap="square" lIns="0" tIns="45700" rIns="0" bIns="45700" anchor="t" anchorCtr="0">
+            <a:spAutoFit/>
+          </a:bodyPr>
+          <a:lstStyle/>
+          <a:p>
+            <a:pPr marL="0" marR="0" lvl="0" indent="0" algn="ctr" rtl="0">
+              <a:spcBef>
+                <a:spcPts val="0"/>
+              </a:spcBef>
+              <a:spcAft>
+                <a:spcPts val="0"/>
+              </a:spcAft>
+              <a:buNone/>
+            </a:pPr>
+            <a:r>
+              <a:rPr lang="ko" sz="1100" dirty="0"/>
+              <a:t>Tibero i</a:t>
+            </a:r>
+            <a:r>
+              <a:rPr lang="ko" sz="1100" b="0" i="0" u="none" strike="noStrike" cap="none" dirty="0">
+                <a:solidFill>
+                  <a:srgbClr val="000000"/>
+                </a:solidFill>
+                <a:latin typeface="Arial"/>
+                <a:ea typeface="Arial"/>
+                <a:cs typeface="Arial"/>
+                <a:sym typeface="Arial"/>
+              </a:rPr>
+              <a:t>nstance</a:t>
+            </a:r>
+            <a:endParaRPr sz="1100" b="0" i="0" u="none" strike="noStrike" cap="none" dirty="0">
+              <a:solidFill>
+                <a:srgbClr val="000000"/>
+              </a:solidFill>
+              <a:latin typeface="Arial"/>
+              <a:ea typeface="Arial"/>
+              <a:cs typeface="Arial"/>
+              <a:sym typeface="Arial"/>
+            </a:endParaRPr>
+          </a:p>
+          <a:p>
+            <a:pPr lvl="0" algn="ctr"/>
+            <a:r>
+              <a:rPr lang="en-US" sz="1100" dirty="0"/>
+              <a:t>with EBS volume</a:t>
+            </a:r>
+            <a:br>
+              <a:rPr lang="en-US" sz="1100" dirty="0"/>
+            </a:br>
+            <a:r>
+              <a:rPr lang="en-US" sz="1100" dirty="0"/>
+              <a:t>(primary)</a:t>
+            </a:r>
+            <a:endParaRPr sz="1100" dirty="0"/>
+          </a:p>
+        </p:txBody>
+      </p:sp>
+      <p:pic>
+        <p:nvPicPr>
+          <p:cNvPr id="497" name="Google Shape;497;p21"/>
+          <p:cNvPicPr preferRelativeResize="0"/>
+          <p:nvPr/>
+        </p:nvPicPr>
+        <p:blipFill rotWithShape="1">
+          <a:blip r:embed="rId7">
+            <a:alphaModFix/>
+          </a:blip>
+          <a:srcRect/>
+          <a:stretch/>
+        </p:blipFill>
+        <p:spPr>
+          <a:xfrm>
+            <a:off x="1401809" y="3622074"/>
+            <a:ext cx="457200" cy="457200"/>
+          </a:xfrm>
+          <a:prstGeom prst="rect">
+            <a:avLst/>
+          </a:prstGeom>
+          <a:noFill/>
+          <a:ln>
+            <a:noFill/>
+          </a:ln>
+        </p:spPr>
+      </p:pic>
+      <p:sp>
+        <p:nvSpPr>
+          <p:cNvPr id="499" name="Google Shape;499;p21"/>
+          <p:cNvSpPr txBox="1"/>
+          <p:nvPr/>
+        </p:nvSpPr>
+        <p:spPr>
+          <a:xfrm>
+            <a:off x="4061657" y="4009993"/>
+            <a:ext cx="1348148" cy="600124"/>
+          </a:xfrm>
+          <a:prstGeom prst="rect">
+            <a:avLst/>
+          </a:prstGeom>
+          <a:noFill/>
+          <a:ln>
+            <a:noFill/>
+          </a:ln>
+        </p:spPr>
+        <p:txBody>
+          <a:bodyPr spcFirstLastPara="1" wrap="square" lIns="0" tIns="45700" rIns="0" bIns="45700" anchor="t" anchorCtr="0">
+            <a:spAutoFit/>
+          </a:bodyPr>
+          <a:lstStyle/>
+          <a:p>
+            <a:pPr marL="0" marR="0" lvl="0" indent="0" algn="ctr" rtl="0">
+              <a:spcBef>
+                <a:spcPts val="0"/>
+              </a:spcBef>
+              <a:spcAft>
+                <a:spcPts val="0"/>
+              </a:spcAft>
+              <a:buNone/>
+            </a:pPr>
+            <a:r>
+              <a:rPr lang="ko" sz="1100" dirty="0"/>
+              <a:t>Tibero i</a:t>
+            </a:r>
+            <a:r>
+              <a:rPr lang="ko" sz="1100" b="0" i="0" u="none" strike="noStrike" cap="none" dirty="0">
+                <a:solidFill>
+                  <a:srgbClr val="000000"/>
+                </a:solidFill>
+                <a:latin typeface="Arial"/>
+                <a:ea typeface="Arial"/>
+                <a:cs typeface="Arial"/>
+                <a:sym typeface="Arial"/>
+              </a:rPr>
+              <a:t>nstance</a:t>
+            </a:r>
+            <a:endParaRPr sz="1100" b="0" i="0" u="none" strike="noStrike" cap="none" dirty="0">
+              <a:solidFill>
+                <a:srgbClr val="000000"/>
+              </a:solidFill>
+              <a:latin typeface="Arial"/>
+              <a:ea typeface="Arial"/>
+              <a:cs typeface="Arial"/>
+              <a:sym typeface="Arial"/>
+            </a:endParaRPr>
+          </a:p>
+          <a:p>
+            <a:pPr lvl="0" algn="ctr"/>
+            <a:r>
+              <a:rPr lang="en-US" sz="1100" dirty="0"/>
+              <a:t>with EBS volume (standby)</a:t>
+            </a:r>
+            <a:endParaRPr sz="1100" dirty="0"/>
+          </a:p>
+        </p:txBody>
+      </p:sp>
+      <p:pic>
+        <p:nvPicPr>
+          <p:cNvPr id="500" name="Google Shape;500;p21"/>
+          <p:cNvPicPr preferRelativeResize="0"/>
+          <p:nvPr/>
+        </p:nvPicPr>
+        <p:blipFill rotWithShape="1">
+          <a:blip r:embed="rId7">
+            <a:alphaModFix/>
+          </a:blip>
+          <a:srcRect/>
+          <a:stretch/>
+        </p:blipFill>
+        <p:spPr>
+          <a:xfrm>
+            <a:off x="4517300" y="3622074"/>
+            <a:ext cx="457200" cy="457200"/>
+          </a:xfrm>
+          <a:prstGeom prst="rect">
+            <a:avLst/>
+          </a:prstGeom>
+          <a:noFill/>
+          <a:ln>
+            <a:noFill/>
+          </a:ln>
+        </p:spPr>
+      </p:pic>
+      <p:sp>
+        <p:nvSpPr>
+          <p:cNvPr id="505" name="Google Shape;505;p21"/>
+          <p:cNvSpPr/>
+          <p:nvPr/>
+        </p:nvSpPr>
+        <p:spPr>
+          <a:xfrm>
+            <a:off x="5744389" y="620486"/>
+            <a:ext cx="1773936" cy="4254764"/>
+          </a:xfrm>
+          <a:prstGeom prst="rect">
+            <a:avLst/>
+          </a:prstGeom>
+          <a:noFill/>
+          <a:ln w="12700" cap="flat" cmpd="sng">
+            <a:solidFill>
+              <a:srgbClr val="5B9CD5"/>
+            </a:solidFill>
+            <a:prstDash val="dash"/>
+            <a:miter lim="800000"/>
+            <a:headEnd type="none" w="sm" len="sm"/>
+            <a:tailEnd type="none" w="sm" len="sm"/>
+          </a:ln>
+        </p:spPr>
+        <p:txBody>
+          <a:bodyPr spcFirstLastPara="1" wrap="square" lIns="91425" tIns="91425" rIns="91425" bIns="45700" anchor="t" anchorCtr="0">
+            <a:noAutofit/>
+          </a:bodyPr>
+          <a:lstStyle/>
+          <a:p>
+            <a:pPr marL="0" marR="0" lvl="0" indent="0" algn="ctr" rtl="0">
+              <a:spcBef>
+                <a:spcPts val="0"/>
+              </a:spcBef>
+              <a:spcAft>
+                <a:spcPts val="0"/>
+              </a:spcAft>
+              <a:buNone/>
+            </a:pPr>
+            <a:r>
+              <a:rPr lang="ko" sz="1200" b="0" i="0" u="none" strike="noStrike" cap="none" dirty="0">
+                <a:solidFill>
+                  <a:srgbClr val="5B9CD5"/>
+                </a:solidFill>
+                <a:latin typeface="Arial"/>
+                <a:ea typeface="Arial"/>
+                <a:cs typeface="Arial"/>
+                <a:sym typeface="Arial"/>
+              </a:rPr>
+              <a:t>Availability Zone </a:t>
+            </a:r>
+            <a:r>
+              <a:rPr lang="ko" sz="1200" dirty="0">
+                <a:solidFill>
+                  <a:srgbClr val="5B9CD5"/>
+                </a:solidFill>
+              </a:rPr>
+              <a:t>3</a:t>
+            </a:r>
+            <a:endParaRPr sz="1200" dirty="0"/>
+          </a:p>
+        </p:txBody>
+      </p:sp>
+      <p:sp>
+        <p:nvSpPr>
+          <p:cNvPr id="506" name="Google Shape;506;p21"/>
+          <p:cNvSpPr/>
+          <p:nvPr/>
+        </p:nvSpPr>
+        <p:spPr>
+          <a:xfrm>
+            <a:off x="5880492" y="1288358"/>
+            <a:ext cx="1563624" cy="1823141"/>
+          </a:xfrm>
+          <a:prstGeom prst="rect">
+            <a:avLst/>
+          </a:prstGeom>
+          <a:solidFill>
+            <a:srgbClr val="1D8900">
+              <a:alpha val="9800"/>
+            </a:srgbClr>
+          </a:solidFill>
+          <a:ln>
+            <a:noFill/>
+          </a:ln>
+        </p:spPr>
+        <p:txBody>
+          <a:bodyPr spcFirstLastPara="1" wrap="square" lIns="338325" tIns="45700" rIns="91425" bIns="45700" anchor="t" anchorCtr="0">
+            <a:noAutofit/>
+          </a:bodyPr>
+          <a:lstStyle/>
+          <a:p>
+            <a:pPr marL="0" marR="0" lvl="0" indent="0" algn="l" rtl="0">
+              <a:spcBef>
+                <a:spcPts val="0"/>
+              </a:spcBef>
+              <a:spcAft>
+                <a:spcPts val="0"/>
+              </a:spcAft>
+              <a:buNone/>
+            </a:pPr>
+            <a:r>
+              <a:rPr lang="ko" sz="1200" b="0" i="0" u="none" strike="noStrike" cap="none" dirty="0">
+                <a:solidFill>
+                  <a:srgbClr val="1E8900"/>
+                </a:solidFill>
+                <a:latin typeface="Arial"/>
+                <a:ea typeface="Arial"/>
+                <a:cs typeface="Arial"/>
+                <a:sym typeface="Arial"/>
+              </a:rPr>
+              <a:t>Public subnet</a:t>
+            </a:r>
+            <a:endParaRPr sz="1200" dirty="0"/>
+          </a:p>
+        </p:txBody>
+      </p:sp>
+      <p:sp>
+        <p:nvSpPr>
+          <p:cNvPr id="507" name="Google Shape;507;p21"/>
+          <p:cNvSpPr/>
+          <p:nvPr/>
+        </p:nvSpPr>
+        <p:spPr>
+          <a:xfrm>
+            <a:off x="5876865" y="3208171"/>
+            <a:ext cx="1563624" cy="1540390"/>
+          </a:xfrm>
+          <a:prstGeom prst="rect">
+            <a:avLst/>
+          </a:prstGeom>
+          <a:solidFill>
+            <a:srgbClr val="007CBC">
+              <a:alpha val="9800"/>
+            </a:srgbClr>
+          </a:solidFill>
+          <a:ln>
+            <a:noFill/>
+          </a:ln>
+        </p:spPr>
+        <p:txBody>
+          <a:bodyPr spcFirstLastPara="1" wrap="square" lIns="338325" tIns="45700" rIns="91425" bIns="45700" anchor="t" anchorCtr="0">
+            <a:noAutofit/>
+          </a:bodyPr>
+          <a:lstStyle/>
+          <a:p>
+            <a:pPr marL="0" marR="0" lvl="0" indent="0" algn="l" rtl="0">
+              <a:spcBef>
+                <a:spcPts val="0"/>
+              </a:spcBef>
+              <a:spcAft>
+                <a:spcPts val="0"/>
+              </a:spcAft>
+              <a:buNone/>
+            </a:pPr>
+            <a:r>
+              <a:rPr lang="ko" sz="1200" b="0" i="0" u="none" strike="noStrike" cap="none" dirty="0">
+                <a:solidFill>
+                  <a:srgbClr val="5B9CD5"/>
+                </a:solidFill>
+                <a:latin typeface="Arial"/>
+                <a:ea typeface="Arial"/>
+                <a:cs typeface="Arial"/>
+                <a:sym typeface="Arial"/>
+              </a:rPr>
+              <a:t>Private subnet</a:t>
+            </a:r>
+            <a:endParaRPr sz="1200" dirty="0"/>
+          </a:p>
+        </p:txBody>
+      </p:sp>
+      <p:sp>
+        <p:nvSpPr>
+          <p:cNvPr id="513" name="Google Shape;513;p21"/>
+          <p:cNvSpPr txBox="1"/>
+          <p:nvPr/>
+        </p:nvSpPr>
+        <p:spPr>
+          <a:xfrm>
+            <a:off x="5943476" y="4009993"/>
+            <a:ext cx="1427913" cy="430847"/>
+          </a:xfrm>
+          <a:prstGeom prst="rect">
+            <a:avLst/>
+          </a:prstGeom>
+          <a:noFill/>
+          <a:ln>
+            <a:noFill/>
+          </a:ln>
+        </p:spPr>
+        <p:txBody>
+          <a:bodyPr spcFirstLastPara="1" wrap="square" lIns="91425" tIns="45700" rIns="91425" bIns="45700" anchor="t" anchorCtr="0">
+            <a:spAutoFit/>
+          </a:bodyPr>
+          <a:lstStyle/>
+          <a:p>
+            <a:pPr marL="0" marR="0" lvl="0" indent="0" algn="ctr" rtl="0">
+              <a:spcBef>
+                <a:spcPts val="0"/>
+              </a:spcBef>
+              <a:spcAft>
+                <a:spcPts val="0"/>
+              </a:spcAft>
+              <a:buNone/>
+            </a:pPr>
+            <a:r>
+              <a:rPr lang="en-US" altLang="ko" sz="1100" dirty="0">
+                <a:solidFill>
+                  <a:srgbClr val="232F3E"/>
+                </a:solidFill>
+              </a:rPr>
+              <a:t>Tibero</a:t>
+            </a:r>
+            <a:br>
+              <a:rPr lang="en-US" altLang="ko" sz="1100" dirty="0">
+                <a:solidFill>
+                  <a:srgbClr val="232F3E"/>
+                </a:solidFill>
+              </a:rPr>
+            </a:br>
+            <a:r>
+              <a:rPr lang="en-US" altLang="ko" sz="1100" dirty="0">
+                <a:solidFill>
+                  <a:srgbClr val="232F3E"/>
+                </a:solidFill>
+              </a:rPr>
+              <a:t>o</a:t>
+            </a:r>
+            <a:r>
+              <a:rPr lang="ko" sz="1100" dirty="0">
+                <a:solidFill>
+                  <a:srgbClr val="232F3E"/>
+                </a:solidFill>
+              </a:rPr>
+              <a:t>bserver</a:t>
+            </a:r>
+            <a:endParaRPr sz="1100" dirty="0">
+              <a:solidFill>
+                <a:srgbClr val="232F3E"/>
+              </a:solidFill>
+            </a:endParaRPr>
+          </a:p>
+        </p:txBody>
+      </p:sp>
+      <p:pic>
+        <p:nvPicPr>
+          <p:cNvPr id="514" name="Google Shape;514;p21"/>
+          <p:cNvPicPr preferRelativeResize="0"/>
+          <p:nvPr/>
+        </p:nvPicPr>
+        <p:blipFill rotWithShape="1">
+          <a:blip r:embed="rId4">
+            <a:alphaModFix/>
+          </a:blip>
+          <a:srcRect/>
+          <a:stretch/>
+        </p:blipFill>
+        <p:spPr>
+          <a:xfrm>
+            <a:off x="5893222" y="1288359"/>
+            <a:ext cx="274638" cy="274638"/>
+          </a:xfrm>
+          <a:prstGeom prst="rect">
+            <a:avLst/>
+          </a:prstGeom>
+          <a:noFill/>
+          <a:ln>
+            <a:noFill/>
+          </a:ln>
+        </p:spPr>
+      </p:pic>
+      <p:pic>
+        <p:nvPicPr>
+          <p:cNvPr id="515" name="Google Shape;515;p21"/>
+          <p:cNvPicPr preferRelativeResize="0"/>
+          <p:nvPr/>
+        </p:nvPicPr>
+        <p:blipFill rotWithShape="1">
+          <a:blip r:embed="rId5">
+            <a:alphaModFix/>
+          </a:blip>
+          <a:srcRect/>
+          <a:stretch/>
+        </p:blipFill>
+        <p:spPr>
+          <a:xfrm>
+            <a:off x="5883368" y="3207922"/>
+            <a:ext cx="274637" cy="274638"/>
+          </a:xfrm>
+          <a:prstGeom prst="rect">
+            <a:avLst/>
+          </a:prstGeom>
+          <a:noFill/>
+          <a:ln>
+            <a:noFill/>
+          </a:ln>
+        </p:spPr>
+      </p:pic>
+      <p:sp>
+        <p:nvSpPr>
+          <p:cNvPr id="520" name="Google Shape;520;p21"/>
+          <p:cNvSpPr txBox="1"/>
+          <p:nvPr/>
+        </p:nvSpPr>
+        <p:spPr>
+          <a:xfrm>
+            <a:off x="856426" y="2763006"/>
+            <a:ext cx="1427913" cy="261570"/>
+          </a:xfrm>
+          <a:prstGeom prst="rect">
+            <a:avLst/>
+          </a:prstGeom>
+          <a:noFill/>
+          <a:ln>
+            <a:noFill/>
+          </a:ln>
+        </p:spPr>
+        <p:txBody>
+          <a:bodyPr spcFirstLastPara="1" wrap="square" lIns="91425" tIns="45700" rIns="91425" bIns="45700" anchor="t" anchorCtr="0">
+            <a:spAutoFit/>
+          </a:bodyPr>
+          <a:lstStyle/>
+          <a:p>
+            <a:pPr marL="0" marR="0" lvl="0" indent="0" algn="ctr" rtl="0">
+              <a:spcBef>
+                <a:spcPts val="0"/>
+              </a:spcBef>
+              <a:spcAft>
+                <a:spcPts val="0"/>
+              </a:spcAft>
+              <a:buNone/>
+            </a:pPr>
+            <a:r>
+              <a:rPr lang="ko" sz="1100" dirty="0">
+                <a:solidFill>
+                  <a:srgbClr val="232F3E"/>
+                </a:solidFill>
+              </a:rPr>
+              <a:t>Bastion</a:t>
+            </a:r>
+            <a:endParaRPr sz="1100" dirty="0">
+              <a:solidFill>
+                <a:srgbClr val="232F3E"/>
+              </a:solidFill>
+            </a:endParaRPr>
+          </a:p>
+        </p:txBody>
+      </p:sp>
+      <p:pic>
+        <p:nvPicPr>
+          <p:cNvPr id="52" name="Graphic 19">
+            <a:extLst>
+              <a:ext uri="{FF2B5EF4-FFF2-40B4-BE49-F238E27FC236}">
+                <a16:creationId xmlns:a16="http://schemas.microsoft.com/office/drawing/2014/main" id="{BF59849E-C8A9-4879-A6D2-56A99919DB3A}"/>
+              </a:ext>
+            </a:extLst>
+          </p:cNvPr>
+          <p:cNvPicPr>
+            <a:picLocks noChangeAspect="1" noChangeArrowheads="1"/>
+          </p:cNvPicPr>
+          <p:nvPr/>
+        </p:nvPicPr>
+        <p:blipFill>
+          <a:blip r:embed="rId8">
+            <a:extLst>
+              <a:ext uri="{28A0092B-C50C-407E-A947-70E740481C1C}">
+                <a14:useLocalDpi xmlns:a14="http://schemas.microsoft.com/office/drawing/2010/main" val="0"/>
+              </a:ext>
+            </a:extLst>
+          </a:blip>
+          <a:srcRect/>
+          <a:stretch>
+            <a:fillRect/>
+          </a:stretch>
+        </p:blipFill>
+        <p:spPr bwMode="auto">
+          <a:xfrm>
+            <a:off x="7897797" y="1177309"/>
+            <a:ext cx="762000" cy="762000"/>
+          </a:xfrm>
+          <a:prstGeom prst="rect">
+            <a:avLst/>
+          </a:prstGeom>
+          <a:noFill/>
+          <a:ln>
+            <a:noFill/>
+          </a:ln>
+          <a:extLst>
+            <a:ext uri="{909E8E84-426E-40DD-AFC4-6F175D3DCCD1}">
+              <a14:hiddenFill xmlns:a14="http://schemas.microsoft.com/office/drawing/2010/main">
+                <a:solidFill>
+                  <a:srgbClr val="FFFFFF"/>
+                </a:solidFill>
+              </a14:hiddenFill>
+            </a:ext>
+            <a:ext uri="{91240B29-F687-4F45-9708-019B960494DF}">
+              <a14:hiddenLine xmlns:a14="http://schemas.microsoft.com/office/drawing/2010/main" w="9525">
+                <a:solidFill>
+                  <a:srgbClr val="000000"/>
+                </a:solidFill>
+                <a:miter lim="800000"/>
+                <a:headEnd/>
+                <a:tailEnd/>
+              </a14:hiddenLine>
+            </a:ext>
+          </a:extLst>
+        </p:spPr>
+      </p:pic>
+      <p:sp>
+        <p:nvSpPr>
+          <p:cNvPr id="53" name="TextBox 11">
+            <a:extLst>
+              <a:ext uri="{FF2B5EF4-FFF2-40B4-BE49-F238E27FC236}">
+                <a16:creationId xmlns:a16="http://schemas.microsoft.com/office/drawing/2014/main" id="{BE476C49-3BB5-4097-BCD2-E414DDB95D86}"/>
+              </a:ext>
+            </a:extLst>
+          </p:cNvPr>
+          <p:cNvSpPr txBox="1">
+            <a:spLocks noChangeArrowheads="1"/>
+          </p:cNvSpPr>
+          <p:nvPr/>
+        </p:nvSpPr>
+        <p:spPr bwMode="auto">
+          <a:xfrm>
+            <a:off x="7744388" y="1948834"/>
+            <a:ext cx="1068819" cy="284810"/>
+          </a:xfrm>
+          <a:prstGeom prst="rect">
+            <a:avLst/>
+          </a:prstGeom>
+          <a:noFill/>
+          <a:ln>
+            <a:noFill/>
+          </a:ln>
+          <a:extLst>
+            <a:ext uri="{909E8E84-426E-40DD-AFC4-6F175D3DCCD1}">
+              <a14:hiddenFill xmlns:a14="http://schemas.microsoft.com/office/drawing/2010/main">
+                <a:solidFill>
+                  <a:srgbClr val="FFFFFF"/>
+                </a:solidFill>
+              </a14:hiddenFill>
+            </a:ext>
+            <a:ext uri="{91240B29-F687-4F45-9708-019B960494DF}">
+              <a14:hiddenLine xmlns:a14="http://schemas.microsoft.com/office/drawing/2010/main" w="9525">
+                <a:solidFill>
+                  <a:srgbClr val="000000"/>
+                </a:solidFill>
+                <a:miter lim="800000"/>
+                <a:headEnd/>
+                <a:tailEnd/>
+              </a14:hiddenLine>
+            </a:ext>
+          </a:extLst>
+        </p:spPr>
+        <p:txBody>
+          <a:bodyPr wrap="square">
+            <a:spAutoFit/>
+          </a:bodyPr>
+          <a:lstStyle>
+            <a:lvl1pPr>
+              <a:defRPr>
+                <a:solidFill>
+                  <a:schemeClr val="tx1"/>
+                </a:solidFill>
+                <a:latin typeface="Calibri" panose="020F0502020204030204" pitchFamily="34" charset="0"/>
+              </a:defRPr>
+            </a:lvl1pPr>
+            <a:lvl2pPr marL="742950" indent="-285750">
+              <a:defRPr>
+                <a:solidFill>
+                  <a:schemeClr val="tx1"/>
+                </a:solidFill>
+                <a:latin typeface="Calibri" panose="020F0502020204030204" pitchFamily="34" charset="0"/>
+              </a:defRPr>
+            </a:lvl2pPr>
+            <a:lvl3pPr marL="1143000" indent="-228600">
+              <a:defRPr>
+                <a:solidFill>
+                  <a:schemeClr val="tx1"/>
+                </a:solidFill>
+                <a:latin typeface="Calibri" panose="020F0502020204030204" pitchFamily="34" charset="0"/>
+              </a:defRPr>
+            </a:lvl3pPr>
+            <a:lvl4pPr marL="1600200" indent="-228600">
+              <a:defRPr>
+                <a:solidFill>
+                  <a:schemeClr val="tx1"/>
+                </a:solidFill>
+                <a:latin typeface="Calibri" panose="020F0502020204030204" pitchFamily="34" charset="0"/>
+              </a:defRPr>
+            </a:lvl4pPr>
+            <a:lvl5pPr marL="2057400" indent="-228600">
+              <a:defRPr>
+                <a:solidFill>
+                  <a:schemeClr val="tx1"/>
+                </a:solidFill>
+                <a:latin typeface="Calibri" panose="020F0502020204030204" pitchFamily="34" charset="0"/>
+              </a:defRPr>
+            </a:lvl5pPr>
+            <a:lvl6pPr marL="2514600" indent="-228600" eaLnBrk="0" fontAlgn="base" hangingPunct="0">
+              <a:spcBef>
+                <a:spcPct val="0"/>
+              </a:spcBef>
+              <a:spcAft>
+                <a:spcPct val="0"/>
+              </a:spcAft>
+              <a:defRPr>
+                <a:solidFill>
+                  <a:schemeClr val="tx1"/>
+                </a:solidFill>
+                <a:latin typeface="Calibri" panose="020F0502020204030204" pitchFamily="34" charset="0"/>
+              </a:defRPr>
+            </a:lvl6pPr>
+            <a:lvl7pPr marL="2971800" indent="-228600" eaLnBrk="0" fontAlgn="base" hangingPunct="0">
+              <a:spcBef>
+                <a:spcPct val="0"/>
+              </a:spcBef>
+              <a:spcAft>
+                <a:spcPct val="0"/>
+              </a:spcAft>
+              <a:defRPr>
+                <a:solidFill>
+                  <a:schemeClr val="tx1"/>
+                </a:solidFill>
+                <a:latin typeface="Calibri" panose="020F0502020204030204" pitchFamily="34" charset="0"/>
+              </a:defRPr>
+            </a:lvl7pPr>
+            <a:lvl8pPr marL="3429000" indent="-228600" eaLnBrk="0" fontAlgn="base" hangingPunct="0">
+              <a:spcBef>
+                <a:spcPct val="0"/>
+              </a:spcBef>
+              <a:spcAft>
+                <a:spcPct val="0"/>
+              </a:spcAft>
+              <a:defRPr>
+                <a:solidFill>
+                  <a:schemeClr val="tx1"/>
+                </a:solidFill>
+                <a:latin typeface="Calibri" panose="020F0502020204030204" pitchFamily="34" charset="0"/>
+              </a:defRPr>
+            </a:lvl8pPr>
+            <a:lvl9pPr marL="3886200" indent="-228600" eaLnBrk="0" fontAlgn="base" hangingPunct="0">
+              <a:spcBef>
+                <a:spcPct val="0"/>
+              </a:spcBef>
+              <a:spcAft>
+                <a:spcPct val="0"/>
+              </a:spcAft>
+              <a:defRPr>
+                <a:solidFill>
+                  <a:schemeClr val="tx1"/>
+                </a:solidFill>
+                <a:latin typeface="Calibri" panose="020F0502020204030204" pitchFamily="34" charset="0"/>
+              </a:defRPr>
+            </a:lvl9pPr>
+          </a:lstStyle>
+          <a:p>
+            <a:pPr algn="ctr" eaLnBrk="1" hangingPunct="1"/>
+            <a:r>
+              <a:rPr lang="en-US" altLang="en-US" sz="1200" dirty="0">
+                <a:latin typeface="Arial" panose="020B0604020202020204" pitchFamily="34" charset="0"/>
+                <a:ea typeface="Amazon Ember" panose="020B0603020204020204" pitchFamily="34" charset="0"/>
+                <a:cs typeface="Arial" panose="020B0604020202020204" pitchFamily="34" charset="0"/>
+              </a:rPr>
+              <a:t>EventBridge</a:t>
+            </a:r>
+          </a:p>
+        </p:txBody>
+      </p:sp>
+      <p:pic>
+        <p:nvPicPr>
+          <p:cNvPr id="54" name="Graphic 10">
+            <a:extLst>
+              <a:ext uri="{FF2B5EF4-FFF2-40B4-BE49-F238E27FC236}">
+                <a16:creationId xmlns:a16="http://schemas.microsoft.com/office/drawing/2014/main" id="{D0A6754F-9DBE-4869-A871-53A0A7539FD8}"/>
+              </a:ext>
+            </a:extLst>
+          </p:cNvPr>
+          <p:cNvPicPr>
+            <a:picLocks noChangeAspect="1" noChangeArrowheads="1"/>
+          </p:cNvPicPr>
+          <p:nvPr/>
+        </p:nvPicPr>
+        <p:blipFill>
+          <a:blip r:embed="rId9">
+            <a:extLst>
+              <a:ext uri="{28A0092B-C50C-407E-A947-70E740481C1C}">
+                <a14:useLocalDpi xmlns:a14="http://schemas.microsoft.com/office/drawing/2010/main" val="0"/>
+              </a:ext>
+            </a:extLst>
+          </a:blip>
+          <a:srcRect/>
+          <a:stretch>
+            <a:fillRect/>
+          </a:stretch>
+        </p:blipFill>
+        <p:spPr bwMode="auto">
+          <a:xfrm>
+            <a:off x="7897797" y="2372785"/>
+            <a:ext cx="762000" cy="762000"/>
+          </a:xfrm>
+          <a:prstGeom prst="rect">
+            <a:avLst/>
+          </a:prstGeom>
+          <a:noFill/>
+          <a:ln>
+            <a:noFill/>
+          </a:ln>
+          <a:extLst>
+            <a:ext uri="{909E8E84-426E-40DD-AFC4-6F175D3DCCD1}">
+              <a14:hiddenFill xmlns:a14="http://schemas.microsoft.com/office/drawing/2010/main">
+                <a:solidFill>
+                  <a:srgbClr val="FFFFFF"/>
+                </a:solidFill>
+              </a14:hiddenFill>
+            </a:ext>
+            <a:ext uri="{91240B29-F687-4F45-9708-019B960494DF}">
+              <a14:hiddenLine xmlns:a14="http://schemas.microsoft.com/office/drawing/2010/main" w="9525">
+                <a:solidFill>
+                  <a:srgbClr val="000000"/>
+                </a:solidFill>
+                <a:miter lim="800000"/>
+                <a:headEnd/>
+                <a:tailEnd/>
+              </a14:hiddenLine>
+            </a:ext>
+          </a:extLst>
+        </p:spPr>
+      </p:pic>
+      <p:sp>
+        <p:nvSpPr>
+          <p:cNvPr id="55" name="TextBox 20">
+            <a:extLst>
+              <a:ext uri="{FF2B5EF4-FFF2-40B4-BE49-F238E27FC236}">
+                <a16:creationId xmlns:a16="http://schemas.microsoft.com/office/drawing/2014/main" id="{0FBBCB1C-C53E-4B0C-A284-B4EB5F375E7E}"/>
+              </a:ext>
+            </a:extLst>
+          </p:cNvPr>
+          <p:cNvSpPr txBox="1">
+            <a:spLocks noChangeArrowheads="1"/>
+          </p:cNvSpPr>
+          <p:nvPr/>
+        </p:nvSpPr>
+        <p:spPr bwMode="auto">
+          <a:xfrm>
+            <a:off x="7661500" y="3133991"/>
+            <a:ext cx="1234595" cy="276999"/>
+          </a:xfrm>
+          <a:prstGeom prst="rect">
+            <a:avLst/>
+          </a:prstGeom>
+          <a:noFill/>
+          <a:ln>
+            <a:noFill/>
+          </a:ln>
+          <a:extLst>
+            <a:ext uri="{909E8E84-426E-40DD-AFC4-6F175D3DCCD1}">
+              <a14:hiddenFill xmlns:a14="http://schemas.microsoft.com/office/drawing/2010/main">
+                <a:solidFill>
+                  <a:srgbClr val="FFFFFF"/>
+                </a:solidFill>
+              </a14:hiddenFill>
+            </a:ext>
+            <a:ext uri="{91240B29-F687-4F45-9708-019B960494DF}">
+              <a14:hiddenLine xmlns:a14="http://schemas.microsoft.com/office/drawing/2010/main" w="9525">
+                <a:solidFill>
+                  <a:srgbClr val="000000"/>
+                </a:solidFill>
+                <a:miter lim="800000"/>
+                <a:headEnd/>
+                <a:tailEnd/>
+              </a14:hiddenLine>
+            </a:ext>
+          </a:extLst>
+        </p:spPr>
+        <p:txBody>
+          <a:bodyPr wrap="square">
+            <a:spAutoFit/>
+          </a:bodyPr>
+          <a:lstStyle>
+            <a:lvl1pPr>
+              <a:defRPr>
+                <a:solidFill>
+                  <a:schemeClr val="tx1"/>
+                </a:solidFill>
+                <a:latin typeface="Calibri" panose="020F0502020204030204" pitchFamily="34" charset="0"/>
+              </a:defRPr>
+            </a:lvl1pPr>
+            <a:lvl2pPr marL="742950" indent="-285750">
+              <a:defRPr>
+                <a:solidFill>
+                  <a:schemeClr val="tx1"/>
+                </a:solidFill>
+                <a:latin typeface="Calibri" panose="020F0502020204030204" pitchFamily="34" charset="0"/>
+              </a:defRPr>
+            </a:lvl2pPr>
+            <a:lvl3pPr marL="1143000" indent="-228600">
+              <a:defRPr>
+                <a:solidFill>
+                  <a:schemeClr val="tx1"/>
+                </a:solidFill>
+                <a:latin typeface="Calibri" panose="020F0502020204030204" pitchFamily="34" charset="0"/>
+              </a:defRPr>
+            </a:lvl3pPr>
+            <a:lvl4pPr marL="1600200" indent="-228600">
+              <a:defRPr>
+                <a:solidFill>
+                  <a:schemeClr val="tx1"/>
+                </a:solidFill>
+                <a:latin typeface="Calibri" panose="020F0502020204030204" pitchFamily="34" charset="0"/>
+              </a:defRPr>
+            </a:lvl4pPr>
+            <a:lvl5pPr marL="2057400" indent="-228600">
+              <a:defRPr>
+                <a:solidFill>
+                  <a:schemeClr val="tx1"/>
+                </a:solidFill>
+                <a:latin typeface="Calibri" panose="020F0502020204030204" pitchFamily="34" charset="0"/>
+              </a:defRPr>
+            </a:lvl5pPr>
+            <a:lvl6pPr marL="2514600" indent="-228600" eaLnBrk="0" fontAlgn="base" hangingPunct="0">
+              <a:spcBef>
+                <a:spcPct val="0"/>
+              </a:spcBef>
+              <a:spcAft>
+                <a:spcPct val="0"/>
+              </a:spcAft>
+              <a:defRPr>
+                <a:solidFill>
+                  <a:schemeClr val="tx1"/>
+                </a:solidFill>
+                <a:latin typeface="Calibri" panose="020F0502020204030204" pitchFamily="34" charset="0"/>
+              </a:defRPr>
+            </a:lvl6pPr>
+            <a:lvl7pPr marL="2971800" indent="-228600" eaLnBrk="0" fontAlgn="base" hangingPunct="0">
+              <a:spcBef>
+                <a:spcPct val="0"/>
+              </a:spcBef>
+              <a:spcAft>
+                <a:spcPct val="0"/>
+              </a:spcAft>
+              <a:defRPr>
+                <a:solidFill>
+                  <a:schemeClr val="tx1"/>
+                </a:solidFill>
+                <a:latin typeface="Calibri" panose="020F0502020204030204" pitchFamily="34" charset="0"/>
+              </a:defRPr>
+            </a:lvl7pPr>
+            <a:lvl8pPr marL="3429000" indent="-228600" eaLnBrk="0" fontAlgn="base" hangingPunct="0">
+              <a:spcBef>
+                <a:spcPct val="0"/>
+              </a:spcBef>
+              <a:spcAft>
+                <a:spcPct val="0"/>
+              </a:spcAft>
+              <a:defRPr>
+                <a:solidFill>
+                  <a:schemeClr val="tx1"/>
+                </a:solidFill>
+                <a:latin typeface="Calibri" panose="020F0502020204030204" pitchFamily="34" charset="0"/>
+              </a:defRPr>
+            </a:lvl8pPr>
+            <a:lvl9pPr marL="3886200" indent="-228600" eaLnBrk="0" fontAlgn="base" hangingPunct="0">
+              <a:spcBef>
+                <a:spcPct val="0"/>
+              </a:spcBef>
+              <a:spcAft>
+                <a:spcPct val="0"/>
+              </a:spcAft>
+              <a:defRPr>
+                <a:solidFill>
+                  <a:schemeClr val="tx1"/>
+                </a:solidFill>
+                <a:latin typeface="Calibri" panose="020F0502020204030204" pitchFamily="34" charset="0"/>
+              </a:defRPr>
+            </a:lvl9pPr>
+          </a:lstStyle>
+          <a:p>
+            <a:pPr algn="ctr" eaLnBrk="1" hangingPunct="1"/>
+            <a:r>
+              <a:rPr lang="en-US" altLang="en-US" sz="1200" dirty="0">
+                <a:latin typeface="Arial" panose="020B0604020202020204" pitchFamily="34" charset="0"/>
+                <a:ea typeface="Amazon Ember" panose="020B0603020204020204" pitchFamily="34" charset="0"/>
+                <a:cs typeface="Arial" panose="020B0604020202020204" pitchFamily="34" charset="0"/>
+              </a:rPr>
+              <a:t>Lambda</a:t>
+            </a:r>
+          </a:p>
+        </p:txBody>
+      </p:sp>
+      <p:pic>
+        <p:nvPicPr>
+          <p:cNvPr id="56" name="Graphic 8">
+            <a:extLst>
+              <a:ext uri="{FF2B5EF4-FFF2-40B4-BE49-F238E27FC236}">
+                <a16:creationId xmlns:a16="http://schemas.microsoft.com/office/drawing/2014/main" id="{6F941FA0-D3EE-42D0-BBAD-E79866AB70CA}"/>
+              </a:ext>
+            </a:extLst>
+          </p:cNvPr>
+          <p:cNvPicPr>
+            <a:picLocks noChangeAspect="1" noChangeArrowheads="1"/>
+          </p:cNvPicPr>
+          <p:nvPr/>
+        </p:nvPicPr>
+        <p:blipFill>
+          <a:blip r:embed="rId10">
+            <a:extLst>
+              <a:ext uri="{28A0092B-C50C-407E-A947-70E740481C1C}">
+                <a14:useLocalDpi xmlns:a14="http://schemas.microsoft.com/office/drawing/2010/main" val="0"/>
+              </a:ext>
+            </a:extLst>
+          </a:blip>
+          <a:srcRect/>
+          <a:stretch>
+            <a:fillRect/>
+          </a:stretch>
+        </p:blipFill>
+        <p:spPr bwMode="auto">
+          <a:xfrm>
+            <a:off x="7897797" y="3547749"/>
+            <a:ext cx="762000" cy="762000"/>
+          </a:xfrm>
+          <a:prstGeom prst="rect">
+            <a:avLst/>
+          </a:prstGeom>
+          <a:noFill/>
+          <a:ln>
+            <a:noFill/>
+          </a:ln>
+          <a:extLst>
+            <a:ext uri="{909E8E84-426E-40DD-AFC4-6F175D3DCCD1}">
+              <a14:hiddenFill xmlns:a14="http://schemas.microsoft.com/office/drawing/2010/main">
+                <a:solidFill>
+                  <a:srgbClr val="FFFFFF"/>
+                </a:solidFill>
+              </a14:hiddenFill>
+            </a:ext>
+            <a:ext uri="{91240B29-F687-4F45-9708-019B960494DF}">
+              <a14:hiddenLine xmlns:a14="http://schemas.microsoft.com/office/drawing/2010/main" w="9525">
+                <a:solidFill>
+                  <a:srgbClr val="000000"/>
+                </a:solidFill>
+                <a:miter lim="800000"/>
+                <a:headEnd/>
+                <a:tailEnd/>
+              </a14:hiddenLine>
+            </a:ext>
+          </a:extLst>
+        </p:spPr>
+      </p:pic>
+      <p:sp>
+        <p:nvSpPr>
+          <p:cNvPr id="57" name="TextBox 9">
+            <a:extLst>
+              <a:ext uri="{FF2B5EF4-FFF2-40B4-BE49-F238E27FC236}">
+                <a16:creationId xmlns:a16="http://schemas.microsoft.com/office/drawing/2014/main" id="{AD0CC44E-F5F6-4E6D-93B1-25A14AF54B3B}"/>
+              </a:ext>
+            </a:extLst>
+          </p:cNvPr>
+          <p:cNvSpPr txBox="1">
+            <a:spLocks noChangeArrowheads="1"/>
+          </p:cNvSpPr>
+          <p:nvPr/>
+        </p:nvSpPr>
+        <p:spPr bwMode="auto">
+          <a:xfrm>
+            <a:off x="7787463" y="4311337"/>
+            <a:ext cx="982669" cy="276999"/>
+          </a:xfrm>
+          <a:prstGeom prst="rect">
+            <a:avLst/>
+          </a:prstGeom>
+          <a:noFill/>
+          <a:ln>
+            <a:noFill/>
+          </a:ln>
+          <a:extLst>
+            <a:ext uri="{909E8E84-426E-40DD-AFC4-6F175D3DCCD1}">
+              <a14:hiddenFill xmlns:a14="http://schemas.microsoft.com/office/drawing/2010/main">
+                <a:solidFill>
+                  <a:srgbClr val="FFFFFF"/>
+                </a:solidFill>
+              </a14:hiddenFill>
+            </a:ext>
+            <a:ext uri="{91240B29-F687-4F45-9708-019B960494DF}">
+              <a14:hiddenLine xmlns:a14="http://schemas.microsoft.com/office/drawing/2010/main" w="9525">
+                <a:solidFill>
+                  <a:srgbClr val="000000"/>
+                </a:solidFill>
+                <a:miter lim="800000"/>
+                <a:headEnd/>
+                <a:tailEnd/>
+              </a14:hiddenLine>
+            </a:ext>
+          </a:extLst>
+        </p:spPr>
+        <p:txBody>
+          <a:bodyPr wrap="square">
+            <a:spAutoFit/>
+          </a:bodyPr>
+          <a:lstStyle>
+            <a:lvl1pPr>
+              <a:defRPr>
+                <a:solidFill>
+                  <a:schemeClr val="tx1"/>
+                </a:solidFill>
+                <a:latin typeface="Calibri" panose="020F0502020204030204" pitchFamily="34" charset="0"/>
+              </a:defRPr>
+            </a:lvl1pPr>
+            <a:lvl2pPr marL="742950" indent="-285750">
+              <a:defRPr>
+                <a:solidFill>
+                  <a:schemeClr val="tx1"/>
+                </a:solidFill>
+                <a:latin typeface="Calibri" panose="020F0502020204030204" pitchFamily="34" charset="0"/>
+              </a:defRPr>
+            </a:lvl2pPr>
+            <a:lvl3pPr marL="1143000" indent="-228600">
+              <a:defRPr>
+                <a:solidFill>
+                  <a:schemeClr val="tx1"/>
+                </a:solidFill>
+                <a:latin typeface="Calibri" panose="020F0502020204030204" pitchFamily="34" charset="0"/>
+              </a:defRPr>
+            </a:lvl3pPr>
+            <a:lvl4pPr marL="1600200" indent="-228600">
+              <a:defRPr>
+                <a:solidFill>
+                  <a:schemeClr val="tx1"/>
+                </a:solidFill>
+                <a:latin typeface="Calibri" panose="020F0502020204030204" pitchFamily="34" charset="0"/>
+              </a:defRPr>
+            </a:lvl4pPr>
+            <a:lvl5pPr marL="2057400" indent="-228600">
+              <a:defRPr>
+                <a:solidFill>
+                  <a:schemeClr val="tx1"/>
+                </a:solidFill>
+                <a:latin typeface="Calibri" panose="020F0502020204030204" pitchFamily="34" charset="0"/>
+              </a:defRPr>
+            </a:lvl5pPr>
+            <a:lvl6pPr marL="2514600" indent="-228600" eaLnBrk="0" fontAlgn="base" hangingPunct="0">
+              <a:spcBef>
+                <a:spcPct val="0"/>
+              </a:spcBef>
+              <a:spcAft>
+                <a:spcPct val="0"/>
+              </a:spcAft>
+              <a:defRPr>
+                <a:solidFill>
+                  <a:schemeClr val="tx1"/>
+                </a:solidFill>
+                <a:latin typeface="Calibri" panose="020F0502020204030204" pitchFamily="34" charset="0"/>
+              </a:defRPr>
+            </a:lvl6pPr>
+            <a:lvl7pPr marL="2971800" indent="-228600" eaLnBrk="0" fontAlgn="base" hangingPunct="0">
+              <a:spcBef>
+                <a:spcPct val="0"/>
+              </a:spcBef>
+              <a:spcAft>
+                <a:spcPct val="0"/>
+              </a:spcAft>
+              <a:defRPr>
+                <a:solidFill>
+                  <a:schemeClr val="tx1"/>
+                </a:solidFill>
+                <a:latin typeface="Calibri" panose="020F0502020204030204" pitchFamily="34" charset="0"/>
+              </a:defRPr>
+            </a:lvl7pPr>
+            <a:lvl8pPr marL="3429000" indent="-228600" eaLnBrk="0" fontAlgn="base" hangingPunct="0">
+              <a:spcBef>
+                <a:spcPct val="0"/>
+              </a:spcBef>
+              <a:spcAft>
+                <a:spcPct val="0"/>
+              </a:spcAft>
+              <a:defRPr>
+                <a:solidFill>
+                  <a:schemeClr val="tx1"/>
+                </a:solidFill>
+                <a:latin typeface="Calibri" panose="020F0502020204030204" pitchFamily="34" charset="0"/>
+              </a:defRPr>
+            </a:lvl8pPr>
+            <a:lvl9pPr marL="3886200" indent="-228600" eaLnBrk="0" fontAlgn="base" hangingPunct="0">
+              <a:spcBef>
+                <a:spcPct val="0"/>
+              </a:spcBef>
+              <a:spcAft>
+                <a:spcPct val="0"/>
+              </a:spcAft>
+              <a:defRPr>
+                <a:solidFill>
+                  <a:schemeClr val="tx1"/>
+                </a:solidFill>
+                <a:latin typeface="Calibri" panose="020F0502020204030204" pitchFamily="34" charset="0"/>
+              </a:defRPr>
+            </a:lvl9pPr>
+          </a:lstStyle>
+          <a:p>
+            <a:pPr algn="ctr" eaLnBrk="1" hangingPunct="1"/>
+            <a:r>
+              <a:rPr lang="en-US" altLang="en-US" sz="1200" dirty="0">
+                <a:latin typeface="Arial" panose="020B0604020202020204" pitchFamily="34" charset="0"/>
+                <a:ea typeface="Amazon Ember" panose="020B0603020204020204" pitchFamily="34" charset="0"/>
+                <a:cs typeface="Arial" panose="020B0604020202020204" pitchFamily="34" charset="0"/>
+              </a:rPr>
+              <a:t>Amazon S3</a:t>
+            </a:r>
+          </a:p>
+        </p:txBody>
+      </p:sp>
+      <p:sp>
+        <p:nvSpPr>
+          <p:cNvPr id="60" name="Rectangle 59">
+            <a:extLst>
+              <a:ext uri="{FF2B5EF4-FFF2-40B4-BE49-F238E27FC236}">
+                <a16:creationId xmlns:a16="http://schemas.microsoft.com/office/drawing/2014/main" id="{936B597D-FE5A-413A-9FF0-19D46D9C8474}"/>
+              </a:ext>
+            </a:extLst>
+          </p:cNvPr>
+          <p:cNvSpPr/>
+          <p:nvPr/>
+        </p:nvSpPr>
+        <p:spPr>
+          <a:xfrm>
+            <a:off x="856427" y="3550720"/>
+            <a:ext cx="4553378" cy="1112697"/>
+          </a:xfrm>
+          <a:prstGeom prst="rect">
+            <a:avLst/>
+          </a:prstGeom>
+          <a:noFill/>
+          <a:ln w="12700">
+            <a:solidFill>
+              <a:srgbClr val="5A6B86"/>
+            </a:solidFill>
+            <a:prstDash val="dash"/>
+          </a:ln>
+        </p:spPr>
+        <p:style>
+          <a:lnRef idx="2">
+            <a:schemeClr val="accent1">
+              <a:shade val="50000"/>
+            </a:schemeClr>
+          </a:lnRef>
+          <a:fillRef idx="1">
+            <a:schemeClr val="accent1"/>
+          </a:fillRef>
+          <a:effectRef idx="0">
+            <a:schemeClr val="accent1"/>
+          </a:effectRef>
+          <a:fontRef idx="minor">
+            <a:schemeClr val="lt1"/>
+          </a:fontRef>
+        </p:style>
+        <p:txBody>
+          <a:bodyPr tIns="91440"/>
+          <a:lstStyle/>
+          <a:p>
+            <a:pPr algn="ctr" eaLnBrk="1" fontAlgn="auto" hangingPunct="1">
+              <a:spcBef>
+                <a:spcPts val="0"/>
+              </a:spcBef>
+              <a:spcAft>
+                <a:spcPts val="0"/>
+              </a:spcAft>
+              <a:defRPr/>
+            </a:pPr>
+            <a:r>
+              <a:rPr lang="en-US" sz="1200" dirty="0">
+                <a:solidFill>
+                  <a:srgbClr val="5A6B86"/>
+                </a:solidFill>
+                <a:latin typeface="Arial" panose="020B0604020202020204" pitchFamily="34" charset="0"/>
+                <a:cs typeface="Arial" panose="020B0604020202020204" pitchFamily="34" charset="0"/>
+              </a:rPr>
+              <a:t>Tibero Standby </a:t>
+            </a:r>
+            <a:br>
+              <a:rPr lang="en-US" sz="1200" dirty="0">
+                <a:solidFill>
+                  <a:srgbClr val="5A6B86"/>
+                </a:solidFill>
+                <a:latin typeface="Arial" panose="020B0604020202020204" pitchFamily="34" charset="0"/>
+                <a:cs typeface="Arial" panose="020B0604020202020204" pitchFamily="34" charset="0"/>
+              </a:rPr>
+            </a:br>
+            <a:r>
+              <a:rPr lang="en-US" sz="1200" dirty="0">
+                <a:solidFill>
+                  <a:srgbClr val="5A6B86"/>
+                </a:solidFill>
+                <a:latin typeface="Arial" panose="020B0604020202020204" pitchFamily="34" charset="0"/>
+                <a:cs typeface="Arial" panose="020B0604020202020204" pitchFamily="34" charset="0"/>
+              </a:rPr>
+              <a:t>Cluster</a:t>
+            </a:r>
+          </a:p>
+        </p:txBody>
+      </p:sp>
+      <p:sp>
+        <p:nvSpPr>
+          <p:cNvPr id="61" name="Rectangle 60">
+            <a:extLst>
+              <a:ext uri="{FF2B5EF4-FFF2-40B4-BE49-F238E27FC236}">
+                <a16:creationId xmlns:a16="http://schemas.microsoft.com/office/drawing/2014/main" id="{CD086156-6C0F-4BC3-A889-D40FB431C079}"/>
+              </a:ext>
+            </a:extLst>
+          </p:cNvPr>
+          <p:cNvSpPr/>
+          <p:nvPr/>
+        </p:nvSpPr>
+        <p:spPr>
+          <a:xfrm>
+            <a:off x="856426" y="2280377"/>
+            <a:ext cx="4553378" cy="722338"/>
+          </a:xfrm>
+          <a:prstGeom prst="rect">
+            <a:avLst/>
+          </a:prstGeom>
+          <a:noFill/>
+          <a:ln w="12700">
+            <a:solidFill>
+              <a:srgbClr val="D86613"/>
+            </a:solidFill>
+            <a:prstDash val="dash"/>
+          </a:ln>
+        </p:spPr>
+        <p:style>
+          <a:lnRef idx="2">
+            <a:schemeClr val="accent1">
+              <a:shade val="50000"/>
+            </a:schemeClr>
+          </a:lnRef>
+          <a:fillRef idx="1">
+            <a:schemeClr val="accent1"/>
+          </a:fillRef>
+          <a:effectRef idx="0">
+            <a:schemeClr val="accent1"/>
+          </a:effectRef>
+          <a:fontRef idx="minor">
+            <a:schemeClr val="lt1"/>
+          </a:fontRef>
+        </p:style>
+        <p:txBody>
+          <a:bodyPr tIns="91440"/>
+          <a:lstStyle/>
+          <a:p>
+            <a:pPr algn="ctr" eaLnBrk="1" fontAlgn="auto" hangingPunct="1">
+              <a:spcBef>
+                <a:spcPts val="0"/>
+              </a:spcBef>
+              <a:spcAft>
+                <a:spcPts val="0"/>
+              </a:spcAft>
+              <a:defRPr/>
+            </a:pPr>
+            <a:endParaRPr lang="en-US" sz="1200" dirty="0">
+              <a:solidFill>
+                <a:srgbClr val="D86613"/>
+              </a:solidFill>
+              <a:latin typeface="Arial" panose="020B0604020202020204" pitchFamily="34" charset="0"/>
+              <a:cs typeface="Arial" panose="020B0604020202020204" pitchFamily="34" charset="0"/>
+            </a:endParaRPr>
+          </a:p>
+          <a:p>
+            <a:pPr algn="ctr" eaLnBrk="1" fontAlgn="auto" hangingPunct="1">
+              <a:spcBef>
+                <a:spcPts val="0"/>
+              </a:spcBef>
+              <a:spcAft>
+                <a:spcPts val="0"/>
+              </a:spcAft>
+              <a:defRPr/>
+            </a:pPr>
+            <a:endParaRPr lang="en-US" sz="1200" dirty="0">
+              <a:solidFill>
+                <a:srgbClr val="D86613"/>
+              </a:solidFill>
+              <a:latin typeface="Arial" panose="020B0604020202020204" pitchFamily="34" charset="0"/>
+              <a:cs typeface="Arial" panose="020B0604020202020204" pitchFamily="34" charset="0"/>
+            </a:endParaRPr>
+          </a:p>
+          <a:p>
+            <a:pPr algn="ctr" eaLnBrk="1" fontAlgn="auto" hangingPunct="1">
+              <a:spcBef>
+                <a:spcPts val="0"/>
+              </a:spcBef>
+              <a:spcAft>
+                <a:spcPts val="0"/>
+              </a:spcAft>
+              <a:defRPr/>
+            </a:pPr>
+            <a:r>
+              <a:rPr lang="en-US" sz="1200" dirty="0">
+                <a:solidFill>
+                  <a:srgbClr val="D86613"/>
+                </a:solidFill>
+                <a:latin typeface="Arial" panose="020B0604020202020204" pitchFamily="34" charset="0"/>
+                <a:cs typeface="Arial" panose="020B0604020202020204" pitchFamily="34" charset="0"/>
+              </a:rPr>
+              <a:t>Auto Scaling group</a:t>
+            </a:r>
+          </a:p>
+        </p:txBody>
+      </p:sp>
+      <p:pic>
+        <p:nvPicPr>
+          <p:cNvPr id="62" name="Graphic 61">
+            <a:extLst>
+              <a:ext uri="{FF2B5EF4-FFF2-40B4-BE49-F238E27FC236}">
+                <a16:creationId xmlns:a16="http://schemas.microsoft.com/office/drawing/2014/main" id="{1033B2EB-28FA-4F05-93F4-0577A73CF9A8}"/>
+              </a:ext>
+            </a:extLst>
+          </p:cNvPr>
+          <p:cNvPicPr>
+            <a:picLocks noChangeAspect="1"/>
+          </p:cNvPicPr>
+          <p:nvPr/>
+        </p:nvPicPr>
+        <p:blipFill>
+          <a:blip r:embed="rId11">
+            <a:extLst>
+              <a:ext uri="{96DAC541-7B7A-43D3-8B79-37D633B846F1}">
+                <asvg:svgBlip xmlns:asvg="http://schemas.microsoft.com/office/drawing/2016/SVG/main" r:embed="rId12"/>
+              </a:ext>
+            </a:extLst>
+          </a:blip>
+          <a:stretch>
+            <a:fillRect/>
+          </a:stretch>
+        </p:blipFill>
+        <p:spPr>
+          <a:xfrm>
+            <a:off x="2949031" y="2280377"/>
+            <a:ext cx="381000" cy="381000"/>
+          </a:xfrm>
+          <a:prstGeom prst="rect">
+            <a:avLst/>
+          </a:prstGeom>
+        </p:spPr>
+      </p:pic>
+      <p:pic>
+        <p:nvPicPr>
+          <p:cNvPr id="63" name="Graphic 60">
+            <a:extLst>
+              <a:ext uri="{FF2B5EF4-FFF2-40B4-BE49-F238E27FC236}">
+                <a16:creationId xmlns:a16="http://schemas.microsoft.com/office/drawing/2014/main" id="{FD0AFB27-B345-404F-8832-CE82B172EA48}"/>
+              </a:ext>
+            </a:extLst>
+          </p:cNvPr>
+          <p:cNvPicPr>
+            <a:picLocks noChangeAspect="1" noChangeArrowheads="1"/>
+          </p:cNvPicPr>
+          <p:nvPr/>
+        </p:nvPicPr>
+        <p:blipFill>
+          <a:blip r:embed="rId13">
+            <a:extLst>
+              <a:ext uri="{28A0092B-C50C-407E-A947-70E740481C1C}">
+                <a14:useLocalDpi xmlns:a14="http://schemas.microsoft.com/office/drawing/2010/main" val="0"/>
+              </a:ext>
+            </a:extLst>
+          </a:blip>
+          <a:srcRect/>
+          <a:stretch>
+            <a:fillRect/>
+          </a:stretch>
+        </p:blipFill>
+        <p:spPr bwMode="auto">
+          <a:xfrm>
+            <a:off x="1344952" y="2326014"/>
+            <a:ext cx="457200" cy="457200"/>
+          </a:xfrm>
+          <a:prstGeom prst="rect">
+            <a:avLst/>
+          </a:prstGeom>
+          <a:noFill/>
+          <a:ln>
+            <a:noFill/>
+          </a:ln>
+          <a:extLst>
+            <a:ext uri="{909E8E84-426E-40DD-AFC4-6F175D3DCCD1}">
+              <a14:hiddenFill xmlns:a14="http://schemas.microsoft.com/office/drawing/2010/main">
+                <a:solidFill>
+                  <a:srgbClr val="FFFFFF"/>
+                </a:solidFill>
+              </a14:hiddenFill>
+            </a:ext>
+            <a:ext uri="{91240B29-F687-4F45-9708-019B960494DF}">
+              <a14:hiddenLine xmlns:a14="http://schemas.microsoft.com/office/drawing/2010/main" w="9525">
+                <a:solidFill>
+                  <a:srgbClr val="000000"/>
+                </a:solidFill>
+                <a:miter lim="800000"/>
+                <a:headEnd/>
+                <a:tailEnd/>
+              </a14:hiddenLine>
+            </a:ext>
+          </a:extLst>
+        </p:spPr>
+      </p:pic>
+      <p:sp>
+        <p:nvSpPr>
+          <p:cNvPr id="65" name="TextBox 17">
+            <a:extLst>
+              <a:ext uri="{FF2B5EF4-FFF2-40B4-BE49-F238E27FC236}">
+                <a16:creationId xmlns:a16="http://schemas.microsoft.com/office/drawing/2014/main" id="{8934D51B-7FC3-4F4B-BABC-2E55CF435262}"/>
+              </a:ext>
+            </a:extLst>
+          </p:cNvPr>
+          <p:cNvSpPr txBox="1">
+            <a:spLocks noChangeArrowheads="1"/>
+          </p:cNvSpPr>
+          <p:nvPr/>
+        </p:nvSpPr>
+        <p:spPr bwMode="auto">
+          <a:xfrm>
+            <a:off x="953597" y="2017018"/>
+            <a:ext cx="1234766" cy="261610"/>
+          </a:xfrm>
+          <a:prstGeom prst="rect">
+            <a:avLst/>
+          </a:prstGeom>
+          <a:noFill/>
+          <a:ln>
+            <a:noFill/>
+          </a:ln>
+          <a:extLst>
+            <a:ext uri="{909E8E84-426E-40DD-AFC4-6F175D3DCCD1}">
+              <a14:hiddenFill xmlns:a14="http://schemas.microsoft.com/office/drawing/2010/main">
+                <a:solidFill>
+                  <a:srgbClr val="FFFFFF"/>
+                </a:solidFill>
+              </a14:hiddenFill>
+            </a:ext>
+            <a:ext uri="{91240B29-F687-4F45-9708-019B960494DF}">
+              <a14:hiddenLine xmlns:a14="http://schemas.microsoft.com/office/drawing/2010/main" w="9525">
+                <a:solidFill>
+                  <a:srgbClr val="000000"/>
+                </a:solidFill>
+                <a:miter lim="800000"/>
+                <a:headEnd/>
+                <a:tailEnd/>
+              </a14:hiddenLine>
+            </a:ext>
+          </a:extLst>
+        </p:spPr>
+        <p:txBody>
+          <a:bodyPr wrap="square">
+            <a:spAutoFit/>
+          </a:bodyPr>
+          <a:lstStyle>
+            <a:lvl1pPr>
+              <a:defRPr>
+                <a:solidFill>
+                  <a:schemeClr val="tx1"/>
+                </a:solidFill>
+                <a:latin typeface="Calibri" panose="020F0502020204030204" pitchFamily="34" charset="0"/>
+              </a:defRPr>
+            </a:lvl1pPr>
+            <a:lvl2pPr marL="742950" indent="-285750">
+              <a:defRPr>
+                <a:solidFill>
+                  <a:schemeClr val="tx1"/>
+                </a:solidFill>
+                <a:latin typeface="Calibri" panose="020F0502020204030204" pitchFamily="34" charset="0"/>
+              </a:defRPr>
+            </a:lvl2pPr>
+            <a:lvl3pPr marL="1143000" indent="-228600">
+              <a:defRPr>
+                <a:solidFill>
+                  <a:schemeClr val="tx1"/>
+                </a:solidFill>
+                <a:latin typeface="Calibri" panose="020F0502020204030204" pitchFamily="34" charset="0"/>
+              </a:defRPr>
+            </a:lvl3pPr>
+            <a:lvl4pPr marL="1600200" indent="-228600">
+              <a:defRPr>
+                <a:solidFill>
+                  <a:schemeClr val="tx1"/>
+                </a:solidFill>
+                <a:latin typeface="Calibri" panose="020F0502020204030204" pitchFamily="34" charset="0"/>
+              </a:defRPr>
+            </a:lvl4pPr>
+            <a:lvl5pPr marL="2057400" indent="-228600">
+              <a:defRPr>
+                <a:solidFill>
+                  <a:schemeClr val="tx1"/>
+                </a:solidFill>
+                <a:latin typeface="Calibri" panose="020F0502020204030204" pitchFamily="34" charset="0"/>
+              </a:defRPr>
+            </a:lvl5pPr>
+            <a:lvl6pPr marL="2514600" indent="-228600" eaLnBrk="0" fontAlgn="base" hangingPunct="0">
+              <a:spcBef>
+                <a:spcPct val="0"/>
+              </a:spcBef>
+              <a:spcAft>
+                <a:spcPct val="0"/>
+              </a:spcAft>
+              <a:defRPr>
+                <a:solidFill>
+                  <a:schemeClr val="tx1"/>
+                </a:solidFill>
+                <a:latin typeface="Calibri" panose="020F0502020204030204" pitchFamily="34" charset="0"/>
+              </a:defRPr>
+            </a:lvl6pPr>
+            <a:lvl7pPr marL="2971800" indent="-228600" eaLnBrk="0" fontAlgn="base" hangingPunct="0">
+              <a:spcBef>
+                <a:spcPct val="0"/>
+              </a:spcBef>
+              <a:spcAft>
+                <a:spcPct val="0"/>
+              </a:spcAft>
+              <a:defRPr>
+                <a:solidFill>
+                  <a:schemeClr val="tx1"/>
+                </a:solidFill>
+                <a:latin typeface="Calibri" panose="020F0502020204030204" pitchFamily="34" charset="0"/>
+              </a:defRPr>
+            </a:lvl7pPr>
+            <a:lvl8pPr marL="3429000" indent="-228600" eaLnBrk="0" fontAlgn="base" hangingPunct="0">
+              <a:spcBef>
+                <a:spcPct val="0"/>
+              </a:spcBef>
+              <a:spcAft>
+                <a:spcPct val="0"/>
+              </a:spcAft>
+              <a:defRPr>
+                <a:solidFill>
+                  <a:schemeClr val="tx1"/>
+                </a:solidFill>
+                <a:latin typeface="Calibri" panose="020F0502020204030204" pitchFamily="34" charset="0"/>
+              </a:defRPr>
+            </a:lvl8pPr>
+            <a:lvl9pPr marL="3886200" indent="-228600" eaLnBrk="0" fontAlgn="base" hangingPunct="0">
+              <a:spcBef>
+                <a:spcPct val="0"/>
+              </a:spcBef>
+              <a:spcAft>
+                <a:spcPct val="0"/>
+              </a:spcAft>
+              <a:defRPr>
+                <a:solidFill>
+                  <a:schemeClr val="tx1"/>
+                </a:solidFill>
+                <a:latin typeface="Calibri" panose="020F0502020204030204" pitchFamily="34" charset="0"/>
+              </a:defRPr>
+            </a:lvl9pPr>
+          </a:lstStyle>
+          <a:p>
+            <a:pPr algn="ctr" eaLnBrk="1" hangingPunct="1"/>
+            <a:r>
+              <a:rPr lang="en-US" altLang="en-US" sz="1100" dirty="0">
+                <a:latin typeface="Arial" panose="020B0604020202020204" pitchFamily="34" charset="0"/>
+                <a:ea typeface="Amazon Ember" panose="020B0603020204020204" pitchFamily="34" charset="0"/>
+                <a:cs typeface="Arial" panose="020B0604020202020204" pitchFamily="34" charset="0"/>
+              </a:rPr>
+              <a:t>NAT gateway</a:t>
+            </a:r>
+          </a:p>
+        </p:txBody>
+      </p:sp>
+      <p:pic>
+        <p:nvPicPr>
+          <p:cNvPr id="66" name="Graphic 35">
+            <a:extLst>
+              <a:ext uri="{FF2B5EF4-FFF2-40B4-BE49-F238E27FC236}">
+                <a16:creationId xmlns:a16="http://schemas.microsoft.com/office/drawing/2014/main" id="{FA75E274-0B19-4C3B-9DB4-012C06261D11}"/>
+              </a:ext>
+            </a:extLst>
+          </p:cNvPr>
+          <p:cNvPicPr>
+            <a:picLocks noChangeAspect="1" noChangeArrowheads="1"/>
+          </p:cNvPicPr>
+          <p:nvPr/>
+        </p:nvPicPr>
+        <p:blipFill>
+          <a:blip r:embed="rId14">
+            <a:extLst>
+              <a:ext uri="{28A0092B-C50C-407E-A947-70E740481C1C}">
+                <a14:useLocalDpi xmlns:a14="http://schemas.microsoft.com/office/drawing/2010/main" val="0"/>
+              </a:ext>
+            </a:extLst>
+          </a:blip>
+          <a:srcRect/>
+          <a:stretch>
+            <a:fillRect/>
+          </a:stretch>
+        </p:blipFill>
+        <p:spPr bwMode="auto">
+          <a:xfrm>
+            <a:off x="1349853" y="1558231"/>
+            <a:ext cx="457200" cy="457200"/>
+          </a:xfrm>
+          <a:prstGeom prst="rect">
+            <a:avLst/>
+          </a:prstGeom>
+          <a:noFill/>
+          <a:ln>
+            <a:noFill/>
+          </a:ln>
+          <a:extLst>
+            <a:ext uri="{909E8E84-426E-40DD-AFC4-6F175D3DCCD1}">
+              <a14:hiddenFill xmlns:a14="http://schemas.microsoft.com/office/drawing/2010/main">
+                <a:solidFill>
+                  <a:srgbClr val="FFFFFF"/>
+                </a:solidFill>
+              </a14:hiddenFill>
+            </a:ext>
+            <a:ext uri="{91240B29-F687-4F45-9708-019B960494DF}">
+              <a14:hiddenLine xmlns:a14="http://schemas.microsoft.com/office/drawing/2010/main" w="9525">
+                <a:solidFill>
+                  <a:srgbClr val="000000"/>
+                </a:solidFill>
+                <a:miter lim="800000"/>
+                <a:headEnd/>
+                <a:tailEnd/>
+              </a14:hiddenLine>
+            </a:ext>
+          </a:extLst>
+        </p:spPr>
+      </p:pic>
+      <p:sp>
+        <p:nvSpPr>
+          <p:cNvPr id="67" name="TextBox 17">
+            <a:extLst>
+              <a:ext uri="{FF2B5EF4-FFF2-40B4-BE49-F238E27FC236}">
+                <a16:creationId xmlns:a16="http://schemas.microsoft.com/office/drawing/2014/main" id="{208DD970-57F1-4595-B3E0-AE1F00BFC042}"/>
+              </a:ext>
+            </a:extLst>
+          </p:cNvPr>
+          <p:cNvSpPr txBox="1">
+            <a:spLocks noChangeArrowheads="1"/>
+          </p:cNvSpPr>
+          <p:nvPr/>
+        </p:nvSpPr>
+        <p:spPr bwMode="auto">
+          <a:xfrm>
+            <a:off x="4122774" y="2017018"/>
+            <a:ext cx="1234766" cy="261610"/>
+          </a:xfrm>
+          <a:prstGeom prst="rect">
+            <a:avLst/>
+          </a:prstGeom>
+          <a:noFill/>
+          <a:ln>
+            <a:noFill/>
+          </a:ln>
+          <a:extLst>
+            <a:ext uri="{909E8E84-426E-40DD-AFC4-6F175D3DCCD1}">
+              <a14:hiddenFill xmlns:a14="http://schemas.microsoft.com/office/drawing/2010/main">
+                <a:solidFill>
+                  <a:srgbClr val="FFFFFF"/>
+                </a:solidFill>
+              </a14:hiddenFill>
+            </a:ext>
+            <a:ext uri="{91240B29-F687-4F45-9708-019B960494DF}">
+              <a14:hiddenLine xmlns:a14="http://schemas.microsoft.com/office/drawing/2010/main" w="9525">
+                <a:solidFill>
+                  <a:srgbClr val="000000"/>
+                </a:solidFill>
+                <a:miter lim="800000"/>
+                <a:headEnd/>
+                <a:tailEnd/>
+              </a14:hiddenLine>
+            </a:ext>
+          </a:extLst>
+        </p:spPr>
+        <p:txBody>
+          <a:bodyPr wrap="square">
+            <a:spAutoFit/>
+          </a:bodyPr>
+          <a:lstStyle>
+            <a:lvl1pPr>
+              <a:defRPr>
+                <a:solidFill>
+                  <a:schemeClr val="tx1"/>
+                </a:solidFill>
+                <a:latin typeface="Calibri" panose="020F0502020204030204" pitchFamily="34" charset="0"/>
+              </a:defRPr>
+            </a:lvl1pPr>
+            <a:lvl2pPr marL="742950" indent="-285750">
+              <a:defRPr>
+                <a:solidFill>
+                  <a:schemeClr val="tx1"/>
+                </a:solidFill>
+                <a:latin typeface="Calibri" panose="020F0502020204030204" pitchFamily="34" charset="0"/>
+              </a:defRPr>
+            </a:lvl2pPr>
+            <a:lvl3pPr marL="1143000" indent="-228600">
+              <a:defRPr>
+                <a:solidFill>
+                  <a:schemeClr val="tx1"/>
+                </a:solidFill>
+                <a:latin typeface="Calibri" panose="020F0502020204030204" pitchFamily="34" charset="0"/>
+              </a:defRPr>
+            </a:lvl3pPr>
+            <a:lvl4pPr marL="1600200" indent="-228600">
+              <a:defRPr>
+                <a:solidFill>
+                  <a:schemeClr val="tx1"/>
+                </a:solidFill>
+                <a:latin typeface="Calibri" panose="020F0502020204030204" pitchFamily="34" charset="0"/>
+              </a:defRPr>
+            </a:lvl4pPr>
+            <a:lvl5pPr marL="2057400" indent="-228600">
+              <a:defRPr>
+                <a:solidFill>
+                  <a:schemeClr val="tx1"/>
+                </a:solidFill>
+                <a:latin typeface="Calibri" panose="020F0502020204030204" pitchFamily="34" charset="0"/>
+              </a:defRPr>
+            </a:lvl5pPr>
+            <a:lvl6pPr marL="2514600" indent="-228600" eaLnBrk="0" fontAlgn="base" hangingPunct="0">
+              <a:spcBef>
+                <a:spcPct val="0"/>
+              </a:spcBef>
+              <a:spcAft>
+                <a:spcPct val="0"/>
+              </a:spcAft>
+              <a:defRPr>
+                <a:solidFill>
+                  <a:schemeClr val="tx1"/>
+                </a:solidFill>
+                <a:latin typeface="Calibri" panose="020F0502020204030204" pitchFamily="34" charset="0"/>
+              </a:defRPr>
+            </a:lvl6pPr>
+            <a:lvl7pPr marL="2971800" indent="-228600" eaLnBrk="0" fontAlgn="base" hangingPunct="0">
+              <a:spcBef>
+                <a:spcPct val="0"/>
+              </a:spcBef>
+              <a:spcAft>
+                <a:spcPct val="0"/>
+              </a:spcAft>
+              <a:defRPr>
+                <a:solidFill>
+                  <a:schemeClr val="tx1"/>
+                </a:solidFill>
+                <a:latin typeface="Calibri" panose="020F0502020204030204" pitchFamily="34" charset="0"/>
+              </a:defRPr>
+            </a:lvl7pPr>
+            <a:lvl8pPr marL="3429000" indent="-228600" eaLnBrk="0" fontAlgn="base" hangingPunct="0">
+              <a:spcBef>
+                <a:spcPct val="0"/>
+              </a:spcBef>
+              <a:spcAft>
+                <a:spcPct val="0"/>
+              </a:spcAft>
+              <a:defRPr>
+                <a:solidFill>
+                  <a:schemeClr val="tx1"/>
+                </a:solidFill>
+                <a:latin typeface="Calibri" panose="020F0502020204030204" pitchFamily="34" charset="0"/>
+              </a:defRPr>
+            </a:lvl8pPr>
+            <a:lvl9pPr marL="3886200" indent="-228600" eaLnBrk="0" fontAlgn="base" hangingPunct="0">
+              <a:spcBef>
+                <a:spcPct val="0"/>
+              </a:spcBef>
+              <a:spcAft>
+                <a:spcPct val="0"/>
+              </a:spcAft>
+              <a:defRPr>
+                <a:solidFill>
+                  <a:schemeClr val="tx1"/>
+                </a:solidFill>
+                <a:latin typeface="Calibri" panose="020F0502020204030204" pitchFamily="34" charset="0"/>
+              </a:defRPr>
+            </a:lvl9pPr>
+          </a:lstStyle>
+          <a:p>
+            <a:pPr algn="ctr" eaLnBrk="1" hangingPunct="1"/>
+            <a:r>
+              <a:rPr lang="en-US" altLang="en-US" sz="1100" dirty="0">
+                <a:latin typeface="Arial" panose="020B0604020202020204" pitchFamily="34" charset="0"/>
+                <a:ea typeface="Amazon Ember" panose="020B0603020204020204" pitchFamily="34" charset="0"/>
+                <a:cs typeface="Arial" panose="020B0604020202020204" pitchFamily="34" charset="0"/>
+              </a:rPr>
+              <a:t>NAT gateway</a:t>
+            </a:r>
+          </a:p>
+        </p:txBody>
+      </p:sp>
+      <p:pic>
+        <p:nvPicPr>
+          <p:cNvPr id="68" name="Graphic 35">
+            <a:extLst>
+              <a:ext uri="{FF2B5EF4-FFF2-40B4-BE49-F238E27FC236}">
+                <a16:creationId xmlns:a16="http://schemas.microsoft.com/office/drawing/2014/main" id="{4A50D1A7-470F-4FE8-91E0-305C715427D3}"/>
+              </a:ext>
+            </a:extLst>
+          </p:cNvPr>
+          <p:cNvPicPr>
+            <a:picLocks noChangeAspect="1" noChangeArrowheads="1"/>
+          </p:cNvPicPr>
+          <p:nvPr/>
+        </p:nvPicPr>
+        <p:blipFill>
+          <a:blip r:embed="rId14">
+            <a:extLst>
+              <a:ext uri="{28A0092B-C50C-407E-A947-70E740481C1C}">
+                <a14:useLocalDpi xmlns:a14="http://schemas.microsoft.com/office/drawing/2010/main" val="0"/>
+              </a:ext>
+            </a:extLst>
+          </a:blip>
+          <a:srcRect/>
+          <a:stretch>
+            <a:fillRect/>
+          </a:stretch>
+        </p:blipFill>
+        <p:spPr bwMode="auto">
+          <a:xfrm>
+            <a:off x="4519030" y="1558231"/>
+            <a:ext cx="457200" cy="457200"/>
+          </a:xfrm>
+          <a:prstGeom prst="rect">
+            <a:avLst/>
+          </a:prstGeom>
+          <a:noFill/>
+          <a:ln>
+            <a:noFill/>
+          </a:ln>
+          <a:extLst>
+            <a:ext uri="{909E8E84-426E-40DD-AFC4-6F175D3DCCD1}">
+              <a14:hiddenFill xmlns:a14="http://schemas.microsoft.com/office/drawing/2010/main">
+                <a:solidFill>
+                  <a:srgbClr val="FFFFFF"/>
+                </a:solidFill>
+              </a14:hiddenFill>
+            </a:ext>
+            <a:ext uri="{91240B29-F687-4F45-9708-019B960494DF}">
+              <a14:hiddenLine xmlns:a14="http://schemas.microsoft.com/office/drawing/2010/main" w="9525">
+                <a:solidFill>
+                  <a:srgbClr val="000000"/>
+                </a:solidFill>
+                <a:miter lim="800000"/>
+                <a:headEnd/>
+                <a:tailEnd/>
+              </a14:hiddenLine>
+            </a:ext>
+          </a:extLst>
+        </p:spPr>
+      </p:pic>
+      <p:sp>
+        <p:nvSpPr>
+          <p:cNvPr id="69" name="TextBox 17">
+            <a:extLst>
+              <a:ext uri="{FF2B5EF4-FFF2-40B4-BE49-F238E27FC236}">
+                <a16:creationId xmlns:a16="http://schemas.microsoft.com/office/drawing/2014/main" id="{C2F0488C-A375-4E14-989D-1B313ACB8170}"/>
+              </a:ext>
+            </a:extLst>
+          </p:cNvPr>
+          <p:cNvSpPr txBox="1">
+            <a:spLocks noChangeArrowheads="1"/>
+          </p:cNvSpPr>
+          <p:nvPr/>
+        </p:nvSpPr>
+        <p:spPr bwMode="auto">
+          <a:xfrm>
+            <a:off x="6040049" y="2017018"/>
+            <a:ext cx="1234766" cy="261610"/>
+          </a:xfrm>
+          <a:prstGeom prst="rect">
+            <a:avLst/>
+          </a:prstGeom>
+          <a:noFill/>
+          <a:ln>
+            <a:noFill/>
+          </a:ln>
+          <a:extLst>
+            <a:ext uri="{909E8E84-426E-40DD-AFC4-6F175D3DCCD1}">
+              <a14:hiddenFill xmlns:a14="http://schemas.microsoft.com/office/drawing/2010/main">
+                <a:solidFill>
+                  <a:srgbClr val="FFFFFF"/>
+                </a:solidFill>
+              </a14:hiddenFill>
+            </a:ext>
+            <a:ext uri="{91240B29-F687-4F45-9708-019B960494DF}">
+              <a14:hiddenLine xmlns:a14="http://schemas.microsoft.com/office/drawing/2010/main" w="9525">
+                <a:solidFill>
+                  <a:srgbClr val="000000"/>
+                </a:solidFill>
+                <a:miter lim="800000"/>
+                <a:headEnd/>
+                <a:tailEnd/>
+              </a14:hiddenLine>
+            </a:ext>
+          </a:extLst>
+        </p:spPr>
+        <p:txBody>
+          <a:bodyPr wrap="square">
+            <a:spAutoFit/>
+          </a:bodyPr>
+          <a:lstStyle>
+            <a:lvl1pPr>
+              <a:defRPr>
+                <a:solidFill>
+                  <a:schemeClr val="tx1"/>
+                </a:solidFill>
+                <a:latin typeface="Calibri" panose="020F0502020204030204" pitchFamily="34" charset="0"/>
+              </a:defRPr>
+            </a:lvl1pPr>
+            <a:lvl2pPr marL="742950" indent="-285750">
+              <a:defRPr>
+                <a:solidFill>
+                  <a:schemeClr val="tx1"/>
+                </a:solidFill>
+                <a:latin typeface="Calibri" panose="020F0502020204030204" pitchFamily="34" charset="0"/>
+              </a:defRPr>
+            </a:lvl2pPr>
+            <a:lvl3pPr marL="1143000" indent="-228600">
+              <a:defRPr>
+                <a:solidFill>
+                  <a:schemeClr val="tx1"/>
+                </a:solidFill>
+                <a:latin typeface="Calibri" panose="020F0502020204030204" pitchFamily="34" charset="0"/>
+              </a:defRPr>
+            </a:lvl3pPr>
+            <a:lvl4pPr marL="1600200" indent="-228600">
+              <a:defRPr>
+                <a:solidFill>
+                  <a:schemeClr val="tx1"/>
+                </a:solidFill>
+                <a:latin typeface="Calibri" panose="020F0502020204030204" pitchFamily="34" charset="0"/>
+              </a:defRPr>
+            </a:lvl4pPr>
+            <a:lvl5pPr marL="2057400" indent="-228600">
+              <a:defRPr>
+                <a:solidFill>
+                  <a:schemeClr val="tx1"/>
+                </a:solidFill>
+                <a:latin typeface="Calibri" panose="020F0502020204030204" pitchFamily="34" charset="0"/>
+              </a:defRPr>
+            </a:lvl5pPr>
+            <a:lvl6pPr marL="2514600" indent="-228600" eaLnBrk="0" fontAlgn="base" hangingPunct="0">
+              <a:spcBef>
+                <a:spcPct val="0"/>
+              </a:spcBef>
+              <a:spcAft>
+                <a:spcPct val="0"/>
+              </a:spcAft>
+              <a:defRPr>
+                <a:solidFill>
+                  <a:schemeClr val="tx1"/>
+                </a:solidFill>
+                <a:latin typeface="Calibri" panose="020F0502020204030204" pitchFamily="34" charset="0"/>
+              </a:defRPr>
+            </a:lvl6pPr>
+            <a:lvl7pPr marL="2971800" indent="-228600" eaLnBrk="0" fontAlgn="base" hangingPunct="0">
+              <a:spcBef>
+                <a:spcPct val="0"/>
+              </a:spcBef>
+              <a:spcAft>
+                <a:spcPct val="0"/>
+              </a:spcAft>
+              <a:defRPr>
+                <a:solidFill>
+                  <a:schemeClr val="tx1"/>
+                </a:solidFill>
+                <a:latin typeface="Calibri" panose="020F0502020204030204" pitchFamily="34" charset="0"/>
+              </a:defRPr>
+            </a:lvl7pPr>
+            <a:lvl8pPr marL="3429000" indent="-228600" eaLnBrk="0" fontAlgn="base" hangingPunct="0">
+              <a:spcBef>
+                <a:spcPct val="0"/>
+              </a:spcBef>
+              <a:spcAft>
+                <a:spcPct val="0"/>
+              </a:spcAft>
+              <a:defRPr>
+                <a:solidFill>
+                  <a:schemeClr val="tx1"/>
+                </a:solidFill>
+                <a:latin typeface="Calibri" panose="020F0502020204030204" pitchFamily="34" charset="0"/>
+              </a:defRPr>
+            </a:lvl8pPr>
+            <a:lvl9pPr marL="3886200" indent="-228600" eaLnBrk="0" fontAlgn="base" hangingPunct="0">
+              <a:spcBef>
+                <a:spcPct val="0"/>
+              </a:spcBef>
+              <a:spcAft>
+                <a:spcPct val="0"/>
+              </a:spcAft>
+              <a:defRPr>
+                <a:solidFill>
+                  <a:schemeClr val="tx1"/>
+                </a:solidFill>
+                <a:latin typeface="Calibri" panose="020F0502020204030204" pitchFamily="34" charset="0"/>
+              </a:defRPr>
+            </a:lvl9pPr>
+          </a:lstStyle>
+          <a:p>
+            <a:pPr algn="ctr" eaLnBrk="1" hangingPunct="1"/>
+            <a:r>
+              <a:rPr lang="en-US" altLang="en-US" sz="1100" dirty="0">
+                <a:latin typeface="Arial" panose="020B0604020202020204" pitchFamily="34" charset="0"/>
+                <a:ea typeface="Amazon Ember" panose="020B0603020204020204" pitchFamily="34" charset="0"/>
+                <a:cs typeface="Arial" panose="020B0604020202020204" pitchFamily="34" charset="0"/>
+              </a:rPr>
+              <a:t>NAT gateway</a:t>
+            </a:r>
+          </a:p>
+        </p:txBody>
+      </p:sp>
+      <p:pic>
+        <p:nvPicPr>
+          <p:cNvPr id="70" name="Graphic 35">
+            <a:extLst>
+              <a:ext uri="{FF2B5EF4-FFF2-40B4-BE49-F238E27FC236}">
+                <a16:creationId xmlns:a16="http://schemas.microsoft.com/office/drawing/2014/main" id="{96CA9471-A0A0-42DB-B922-6B5B8C3EB4D7}"/>
+              </a:ext>
+            </a:extLst>
+          </p:cNvPr>
+          <p:cNvPicPr>
+            <a:picLocks noChangeAspect="1" noChangeArrowheads="1"/>
+          </p:cNvPicPr>
+          <p:nvPr/>
+        </p:nvPicPr>
+        <p:blipFill>
+          <a:blip r:embed="rId14">
+            <a:extLst>
+              <a:ext uri="{28A0092B-C50C-407E-A947-70E740481C1C}">
+                <a14:useLocalDpi xmlns:a14="http://schemas.microsoft.com/office/drawing/2010/main" val="0"/>
+              </a:ext>
+            </a:extLst>
+          </a:blip>
+          <a:srcRect/>
+          <a:stretch>
+            <a:fillRect/>
+          </a:stretch>
+        </p:blipFill>
+        <p:spPr bwMode="auto">
+          <a:xfrm>
+            <a:off x="6428832" y="1558231"/>
+            <a:ext cx="457200" cy="457200"/>
+          </a:xfrm>
+          <a:prstGeom prst="rect">
+            <a:avLst/>
+          </a:prstGeom>
+          <a:noFill/>
+          <a:ln>
+            <a:noFill/>
+          </a:ln>
+          <a:extLst>
+            <a:ext uri="{909E8E84-426E-40DD-AFC4-6F175D3DCCD1}">
+              <a14:hiddenFill xmlns:a14="http://schemas.microsoft.com/office/drawing/2010/main">
+                <a:solidFill>
+                  <a:srgbClr val="FFFFFF"/>
+                </a:solidFill>
+              </a14:hiddenFill>
+            </a:ext>
+            <a:ext uri="{91240B29-F687-4F45-9708-019B960494DF}">
+              <a14:hiddenLine xmlns:a14="http://schemas.microsoft.com/office/drawing/2010/main" w="9525">
+                <a:solidFill>
+                  <a:srgbClr val="000000"/>
+                </a:solidFill>
+                <a:miter lim="800000"/>
+                <a:headEnd/>
+                <a:tailEnd/>
+              </a14:hiddenLine>
+            </a:ext>
+          </a:extLst>
+        </p:spPr>
+      </p:pic>
+      <p:pic>
+        <p:nvPicPr>
+          <p:cNvPr id="71" name="Graphic 60">
+            <a:extLst>
+              <a:ext uri="{FF2B5EF4-FFF2-40B4-BE49-F238E27FC236}">
+                <a16:creationId xmlns:a16="http://schemas.microsoft.com/office/drawing/2014/main" id="{E27F2D00-D5C9-4539-B045-79ED172C9ED1}"/>
+              </a:ext>
+            </a:extLst>
+          </p:cNvPr>
+          <p:cNvPicPr>
+            <a:picLocks noChangeAspect="1" noChangeArrowheads="1"/>
+          </p:cNvPicPr>
+          <p:nvPr/>
+        </p:nvPicPr>
+        <p:blipFill>
+          <a:blip r:embed="rId13">
+            <a:extLst>
+              <a:ext uri="{28A0092B-C50C-407E-A947-70E740481C1C}">
+                <a14:useLocalDpi xmlns:a14="http://schemas.microsoft.com/office/drawing/2010/main" val="0"/>
+              </a:ext>
+            </a:extLst>
+          </a:blip>
+          <a:srcRect/>
+          <a:stretch>
+            <a:fillRect/>
+          </a:stretch>
+        </p:blipFill>
+        <p:spPr bwMode="auto">
+          <a:xfrm>
+            <a:off x="6428832" y="3599403"/>
+            <a:ext cx="457200" cy="457200"/>
+          </a:xfrm>
+          <a:prstGeom prst="rect">
+            <a:avLst/>
+          </a:prstGeom>
+          <a:noFill/>
+          <a:ln>
+            <a:noFill/>
+          </a:ln>
+          <a:extLst>
+            <a:ext uri="{909E8E84-426E-40DD-AFC4-6F175D3DCCD1}">
+              <a14:hiddenFill xmlns:a14="http://schemas.microsoft.com/office/drawing/2010/main">
+                <a:solidFill>
+                  <a:srgbClr val="FFFFFF"/>
+                </a:solidFill>
+              </a14:hiddenFill>
+            </a:ext>
+            <a:ext uri="{91240B29-F687-4F45-9708-019B960494DF}">
+              <a14:hiddenLine xmlns:a14="http://schemas.microsoft.com/office/drawing/2010/main" w="9525">
+                <a:solidFill>
+                  <a:srgbClr val="000000"/>
+                </a:solidFill>
+                <a:miter lim="800000"/>
+                <a:headEnd/>
+                <a:tailEnd/>
+              </a14:hiddenLine>
+            </a:ext>
+          </a:extLst>
+        </p:spPr>
+      </p:pic>
+    </p:spTree>
+  </p:cSld>
+  <p:clrMapOvr>
+    <a:masterClrMapping/>
+  </p:clrMapOvr>
+</p:sld>
+</file>
+
+<file path=ppt/slides/slide2.xml><?xml version="1.0" encoding="utf-8"?>
+<p:sld xmlns:a="http://schemas.openxmlformats.org/drawingml/2006/main" xmlns:r="http://schemas.openxmlformats.org/officeDocument/2006/relationships" xmlns:p="http://schemas.openxmlformats.org/presentationml/2006/main">
+  <p:cSld>
+    <p:spTree>
+      <p:nvGrpSpPr>
+        <p:cNvPr id="1" name="Shape 460"/>
+        <p:cNvGrpSpPr/>
+        <p:nvPr/>
+      </p:nvGrpSpPr>
+      <p:grpSpPr>
+        <a:xfrm>
+          <a:off x="0" y="0"/>
+          <a:ext cx="0" cy="0"/>
+          <a:chOff x="0" y="0"/>
+          <a:chExt cx="0" cy="0"/>
+        </a:xfrm>
+      </p:grpSpPr>
+      <p:sp>
+        <p:nvSpPr>
+          <p:cNvPr id="461" name="Google Shape;461;p21"/>
+          <p:cNvSpPr/>
+          <p:nvPr/>
+        </p:nvSpPr>
+        <p:spPr>
+          <a:xfrm>
+            <a:off x="207875" y="268250"/>
+            <a:ext cx="8845200" cy="4682400"/>
+          </a:xfrm>
+          <a:prstGeom prst="rect">
+            <a:avLst/>
+          </a:prstGeom>
+          <a:noFill/>
+          <a:ln w="12700" cap="flat" cmpd="sng">
+            <a:solidFill>
+              <a:srgbClr val="000000"/>
+            </a:solidFill>
+            <a:prstDash val="solid"/>
+            <a:miter lim="800000"/>
+            <a:headEnd type="none" w="sm" len="sm"/>
+            <a:tailEnd type="none" w="sm" len="sm"/>
+          </a:ln>
+        </p:spPr>
+        <p:txBody>
+          <a:bodyPr spcFirstLastPara="1" wrap="square" lIns="457200" tIns="91425" rIns="91425" bIns="45700" anchor="t" anchorCtr="0">
+            <a:noAutofit/>
+          </a:bodyPr>
+          <a:lstStyle/>
+          <a:p>
+            <a:pPr marL="0" marR="0" lvl="0" indent="0" algn="l" rtl="0">
+              <a:spcBef>
+                <a:spcPts val="0"/>
+              </a:spcBef>
+              <a:spcAft>
+                <a:spcPts val="0"/>
+              </a:spcAft>
+              <a:buNone/>
+            </a:pPr>
+            <a:r>
+              <a:rPr lang="ko" sz="1000" b="0" i="0" u="none" strike="noStrike" cap="none">
+                <a:solidFill>
+                  <a:srgbClr val="000000"/>
+                </a:solidFill>
+                <a:latin typeface="Arial"/>
+                <a:ea typeface="Arial"/>
+                <a:cs typeface="Arial"/>
+                <a:sym typeface="Arial"/>
+              </a:rPr>
+              <a:t>AWS Cloud</a:t>
+            </a:r>
+            <a:endParaRPr sz="1300" dirty="0"/>
+          </a:p>
+        </p:txBody>
+      </p:sp>
+      <p:sp>
+        <p:nvSpPr>
+          <p:cNvPr id="462" name="Google Shape;462;p21"/>
+          <p:cNvSpPr/>
+          <p:nvPr/>
+        </p:nvSpPr>
+        <p:spPr>
+          <a:xfrm>
+            <a:off x="1172028" y="1274150"/>
+            <a:ext cx="7722000" cy="3552300"/>
+          </a:xfrm>
+          <a:prstGeom prst="rect">
+            <a:avLst/>
+          </a:prstGeom>
+          <a:noFill/>
+          <a:ln w="12700" cap="flat" cmpd="sng">
+            <a:solidFill>
+              <a:srgbClr val="1E8900"/>
+            </a:solidFill>
+            <a:prstDash val="solid"/>
+            <a:miter lim="800000"/>
+            <a:headEnd type="none" w="sm" len="sm"/>
+            <a:tailEnd type="none" w="sm" len="sm"/>
+          </a:ln>
+        </p:spPr>
+        <p:txBody>
+          <a:bodyPr spcFirstLastPara="1" wrap="square" lIns="457200" tIns="91425" rIns="91425" bIns="45700" anchor="t" anchorCtr="0">
+            <a:noAutofit/>
+          </a:bodyPr>
+          <a:lstStyle/>
+          <a:p>
+            <a:pPr marL="0" marR="0" lvl="0" indent="0" algn="l" rtl="0">
+              <a:spcBef>
+                <a:spcPts val="0"/>
+              </a:spcBef>
+              <a:spcAft>
+                <a:spcPts val="0"/>
+              </a:spcAft>
+              <a:buNone/>
+            </a:pPr>
+            <a:r>
+              <a:rPr lang="ko" sz="1000" b="0" i="0" u="none" strike="noStrike" cap="none">
+                <a:solidFill>
+                  <a:srgbClr val="1E8900"/>
+                </a:solidFill>
+                <a:latin typeface="Arial"/>
+                <a:ea typeface="Arial"/>
+                <a:cs typeface="Arial"/>
+                <a:sym typeface="Arial"/>
+              </a:rPr>
+              <a:t>VPC</a:t>
+            </a:r>
+            <a:endParaRPr sz="1200" dirty="0"/>
+          </a:p>
+        </p:txBody>
+      </p:sp>
+      <p:sp>
+        <p:nvSpPr>
+          <p:cNvPr id="463" name="Google Shape;463;p21"/>
+          <p:cNvSpPr/>
+          <p:nvPr/>
+        </p:nvSpPr>
+        <p:spPr>
+          <a:xfrm>
+            <a:off x="1307803" y="1704550"/>
+            <a:ext cx="2329200" cy="2982900"/>
+          </a:xfrm>
+          <a:prstGeom prst="rect">
+            <a:avLst/>
+          </a:prstGeom>
+          <a:noFill/>
+          <a:ln w="12700" cap="flat" cmpd="sng">
+            <a:solidFill>
+              <a:srgbClr val="5B9CD5"/>
+            </a:solidFill>
+            <a:prstDash val="dash"/>
+            <a:miter lim="800000"/>
+            <a:headEnd type="none" w="sm" len="sm"/>
+            <a:tailEnd type="none" w="sm" len="sm"/>
+          </a:ln>
+        </p:spPr>
+        <p:txBody>
+          <a:bodyPr spcFirstLastPara="1" wrap="square" lIns="91425" tIns="91425" rIns="91425" bIns="45700" anchor="t" anchorCtr="0">
+            <a:noAutofit/>
+          </a:bodyPr>
+          <a:lstStyle/>
+          <a:p>
+            <a:pPr marL="0" marR="0" lvl="0" indent="0" algn="ctr" rtl="0">
+              <a:spcBef>
+                <a:spcPts val="0"/>
+              </a:spcBef>
+              <a:spcAft>
+                <a:spcPts val="0"/>
+              </a:spcAft>
+              <a:buNone/>
+            </a:pPr>
+            <a:r>
+              <a:rPr lang="ko" sz="1000" b="0" i="0" u="none" strike="noStrike" cap="none">
+                <a:solidFill>
+                  <a:srgbClr val="5B9CD5"/>
+                </a:solidFill>
+                <a:latin typeface="Arial"/>
+                <a:ea typeface="Arial"/>
+                <a:cs typeface="Arial"/>
+                <a:sym typeface="Arial"/>
+              </a:rPr>
+              <a:t>Availability Zone 1</a:t>
+            </a:r>
+            <a:endParaRPr sz="1000" dirty="0"/>
+          </a:p>
+        </p:txBody>
+      </p:sp>
+      <p:pic>
+        <p:nvPicPr>
+          <p:cNvPr id="464" name="Google Shape;464;p21"/>
+          <p:cNvPicPr preferRelativeResize="0"/>
+          <p:nvPr/>
+        </p:nvPicPr>
+        <p:blipFill rotWithShape="1">
+          <a:blip r:embed="rId3">
+            <a:alphaModFix/>
+          </a:blip>
+          <a:srcRect/>
+          <a:stretch/>
+        </p:blipFill>
+        <p:spPr>
+          <a:xfrm>
+            <a:off x="210831" y="267190"/>
+            <a:ext cx="300501" cy="274650"/>
+          </a:xfrm>
+          <a:prstGeom prst="rect">
+            <a:avLst/>
+          </a:prstGeom>
+          <a:noFill/>
+          <a:ln>
+            <a:noFill/>
+          </a:ln>
+        </p:spPr>
+      </p:pic>
+      <p:sp>
+        <p:nvSpPr>
+          <p:cNvPr id="465" name="Google Shape;465;p21"/>
+          <p:cNvSpPr/>
+          <p:nvPr/>
+        </p:nvSpPr>
+        <p:spPr>
+          <a:xfrm>
+            <a:off x="1443905" y="2088250"/>
+            <a:ext cx="2077200" cy="1173600"/>
+          </a:xfrm>
+          <a:prstGeom prst="rect">
+            <a:avLst/>
+          </a:prstGeom>
+          <a:solidFill>
+            <a:srgbClr val="1D8900">
+              <a:alpha val="9800"/>
+            </a:srgbClr>
+          </a:solidFill>
+          <a:ln>
+            <a:noFill/>
+          </a:ln>
+        </p:spPr>
+        <p:txBody>
+          <a:bodyPr spcFirstLastPara="1" wrap="square" lIns="338325" tIns="45700" rIns="91425" bIns="45700" anchor="t" anchorCtr="0">
+            <a:noAutofit/>
+          </a:bodyPr>
+          <a:lstStyle/>
+          <a:p>
+            <a:pPr marL="0" marR="0" lvl="0" indent="0" algn="l" rtl="0">
+              <a:spcBef>
+                <a:spcPts val="0"/>
+              </a:spcBef>
+              <a:spcAft>
+                <a:spcPts val="0"/>
+              </a:spcAft>
+              <a:buNone/>
+            </a:pPr>
+            <a:r>
+              <a:rPr lang="ko" sz="1000" b="0" i="0" u="none" strike="noStrike" cap="none">
+                <a:solidFill>
+                  <a:srgbClr val="1E8900"/>
+                </a:solidFill>
+                <a:latin typeface="Arial"/>
+                <a:ea typeface="Arial"/>
+                <a:cs typeface="Arial"/>
+                <a:sym typeface="Arial"/>
+              </a:rPr>
+              <a:t>Public subnet</a:t>
+            </a:r>
+            <a:endParaRPr sz="1200" dirty="0"/>
           </a:p>
         </p:txBody>
       </p:sp>
@@ -5897,7 +8878,7 @@
               </a:rPr>
               <a:t>Private subnet</a:t>
             </a:r>
-            <a:endParaRPr sz="1200"/>
+            <a:endParaRPr sz="1200" dirty="0"/>
           </a:p>
         </p:txBody>
       </p:sp>
@@ -6015,7 +8996,7 @@
                 </a:rPr>
                 <a:t>Amazon EBS</a:t>
               </a:r>
-              <a:endParaRPr sz="1200"/>
+              <a:endParaRPr sz="1200" dirty="0"/>
             </a:p>
           </p:txBody>
         </p:sp>
@@ -6107,7 +9088,7 @@
                 </a:rPr>
                 <a:t>NAT</a:t>
               </a:r>
-              <a:endParaRPr sz="1000">
+              <a:endParaRPr sz="1000" dirty="0">
                 <a:solidFill>
                   <a:srgbClr val="232F3E"/>
                 </a:solidFill>
@@ -6135,7 +9116,7 @@
                 </a:rPr>
                 <a:t>gateway</a:t>
               </a:r>
-              <a:endParaRPr sz="1300"/>
+              <a:endParaRPr sz="1300" dirty="0"/>
             </a:p>
           </p:txBody>
         </p:sp>
@@ -6196,7 +9177,7 @@
                 </a:spcAft>
                 <a:buNone/>
               </a:pPr>
-              <a:endParaRPr/>
+              <a:endParaRPr dirty="0"/>
             </a:p>
           </p:txBody>
         </p:sp>
@@ -6242,7 +9223,7 @@
                 </a:spcAft>
                 <a:buNone/>
               </a:pPr>
-              <a:endParaRPr/>
+              <a:endParaRPr dirty="0"/>
             </a:p>
           </p:txBody>
         </p:sp>
@@ -6349,7 +9330,7 @@
                   </a:rPr>
                   <a:t>gateway</a:t>
                 </a:r>
-                <a:endParaRPr sz="1300"/>
+                <a:endParaRPr sz="1300" dirty="0"/>
               </a:p>
             </p:txBody>
           </p:sp>
@@ -6442,7 +9423,7 @@
               </a:rPr>
               <a:t>2</a:t>
             </a:r>
-            <a:endParaRPr sz="1000"/>
+            <a:endParaRPr sz="1000" dirty="0"/>
           </a:p>
         </p:txBody>
       </p:sp>
@@ -6496,7 +9477,7 @@
               </a:rPr>
               <a:t>Public subnet</a:t>
             </a:r>
-            <a:endParaRPr sz="1200"/>
+            <a:endParaRPr sz="1200" dirty="0"/>
           </a:p>
         </p:txBody>
       </p:sp>
@@ -6577,7 +9558,7 @@
               </a:rPr>
               <a:t>Private subnet</a:t>
             </a:r>
-            <a:endParaRPr sz="1200"/>
+            <a:endParaRPr sz="1200" dirty="0"/>
           </a:p>
         </p:txBody>
       </p:sp>
@@ -6695,7 +9676,7 @@
                 </a:rPr>
                 <a:t>NAT</a:t>
               </a:r>
-              <a:endParaRPr sz="1000">
+              <a:endParaRPr sz="1000" dirty="0">
                 <a:solidFill>
                   <a:srgbClr val="232F3E"/>
                 </a:solidFill>
@@ -6723,7 +9704,7 @@
                 </a:rPr>
                 <a:t>gateway</a:t>
               </a:r>
-              <a:endParaRPr sz="1300"/>
+              <a:endParaRPr sz="1300" dirty="0"/>
             </a:p>
           </p:txBody>
         </p:sp>
@@ -6815,7 +9796,7 @@
                 </a:rPr>
                 <a:t>Amazon EBS</a:t>
               </a:r>
-              <a:endParaRPr sz="1200"/>
+              <a:endParaRPr sz="1200" dirty="0"/>
             </a:p>
           </p:txBody>
         </p:sp>
@@ -6860,7 +9841,7 @@
               </a:spcAft>
               <a:buNone/>
             </a:pPr>
-            <a:endParaRPr sz="1000">
+            <a:endParaRPr sz="1000" dirty="0">
               <a:solidFill>
                 <a:srgbClr val="5A6B86"/>
               </a:solidFill>
@@ -6884,7 +9865,7 @@
               </a:rPr>
               <a:t>TSC mode</a:t>
             </a:r>
-            <a:endParaRPr sz="1200">
+            <a:endParaRPr sz="1200" dirty="0">
               <a:solidFill>
                 <a:schemeClr val="dk1"/>
               </a:solidFill>
@@ -6982,7 +9963,7 @@
                 </a:rPr>
                 <a:t>nstance</a:t>
               </a:r>
-              <a:endParaRPr sz="1000" b="0" i="0" u="none" strike="noStrike" cap="none">
+              <a:endParaRPr sz="1000" b="0" i="0" u="none" strike="noStrike" cap="none" dirty="0">
                 <a:solidFill>
                   <a:srgbClr val="000000"/>
                 </a:solidFill>
@@ -7006,7 +9987,7 @@
                 <a:rPr lang="ko" sz="1000"/>
                 <a:t>(Primary)</a:t>
               </a:r>
-              <a:endParaRPr sz="1000"/>
+              <a:endParaRPr sz="1000" dirty="0"/>
             </a:p>
           </p:txBody>
         </p:sp>
@@ -7102,7 +10083,7 @@
                 </a:rPr>
                 <a:t>nstance</a:t>
               </a:r>
-              <a:endParaRPr sz="1000" b="0" i="0" u="none" strike="noStrike" cap="none">
+              <a:endParaRPr sz="1000" b="0" i="0" u="none" strike="noStrike" cap="none" dirty="0">
                 <a:solidFill>
                   <a:srgbClr val="000000"/>
                 </a:solidFill>
@@ -7126,7 +10107,7 @@
                 <a:rPr lang="ko" sz="1000"/>
                 <a:t>(Standby)</a:t>
               </a:r>
-              <a:endParaRPr sz="1000"/>
+              <a:endParaRPr sz="1000" dirty="0"/>
             </a:p>
           </p:txBody>
         </p:sp>
@@ -7245,7 +10226,7 @@
                 </a:rPr>
                 <a:t>AWS Lambda</a:t>
               </a:r>
-              <a:endParaRPr sz="1000"/>
+              <a:endParaRPr sz="1000" dirty="0"/>
             </a:p>
           </p:txBody>
         </p:sp>
@@ -7336,7 +10317,7 @@
               </a:rPr>
               <a:t>3</a:t>
             </a:r>
-            <a:endParaRPr sz="1000"/>
+            <a:endParaRPr sz="1000" dirty="0"/>
           </a:p>
         </p:txBody>
       </p:sp>
@@ -7390,7 +10371,7 @@
               </a:rPr>
               <a:t>Public subnet</a:t>
             </a:r>
-            <a:endParaRPr sz="1200"/>
+            <a:endParaRPr sz="1200" dirty="0"/>
           </a:p>
         </p:txBody>
       </p:sp>
@@ -7444,7 +10425,7 @@
               </a:rPr>
               <a:t>Private subnet</a:t>
             </a:r>
-            <a:endParaRPr sz="1200"/>
+            <a:endParaRPr sz="1200" dirty="0"/>
           </a:p>
         </p:txBody>
       </p:sp>
@@ -7524,7 +10505,7 @@
                 <a:buNone/>
               </a:pPr>
               <a:r>
-                <a:rPr lang="ko" sz="1000" b="0" i="0" u="none" strike="noStrike" cap="none">
+                <a:rPr lang="ko" sz="1000" b="0" i="0" u="none" strike="noStrike" cap="none" dirty="0">
                   <a:solidFill>
                     <a:srgbClr val="232F3E"/>
                   </a:solidFill>
@@ -7535,7 +10516,7 @@
                 </a:rPr>
                 <a:t>NAT</a:t>
               </a:r>
-              <a:endParaRPr sz="1000">
+              <a:endParaRPr sz="1000" dirty="0">
                 <a:solidFill>
                   <a:srgbClr val="232F3E"/>
                 </a:solidFill>
@@ -7552,7 +10533,7 @@
                 <a:buNone/>
               </a:pPr>
               <a:r>
-                <a:rPr lang="ko" sz="1000" b="0" i="0" u="none" strike="noStrike" cap="none">
+                <a:rPr lang="ko" sz="1000" b="0" i="0" u="none" strike="noStrike" cap="none" dirty="0">
                   <a:solidFill>
                     <a:srgbClr val="232F3E"/>
                   </a:solidFill>
@@ -7563,7 +10544,7 @@
                 </a:rPr>
                 <a:t>gateway</a:t>
               </a:r>
-              <a:endParaRPr sz="1300"/>
+              <a:endParaRPr sz="1300" dirty="0"/>
             </a:p>
           </p:txBody>
         </p:sp>
@@ -7644,14 +10625,14 @@
                 <a:buNone/>
               </a:pPr>
               <a:r>
-                <a:rPr lang="ko" sz="1000">
+                <a:rPr lang="ko" sz="1000" dirty="0">
                   <a:solidFill>
                     <a:srgbClr val="232F3E"/>
                   </a:solidFill>
                 </a:rPr>
                 <a:t>Observer</a:t>
               </a:r>
-              <a:endParaRPr sz="1000">
+              <a:endParaRPr sz="1000" dirty="0">
                 <a:solidFill>
                   <a:srgbClr val="232F3E"/>
                 </a:solidFill>
@@ -7668,7 +10649,7 @@
                 <a:buNone/>
               </a:pPr>
               <a:r>
-                <a:rPr lang="ko" sz="1000">
+                <a:rPr lang="ko" sz="1000" dirty="0">
                   <a:solidFill>
                     <a:srgbClr val="232F3E"/>
                   </a:solidFill>
@@ -7676,7 +10657,7 @@
                 <a:t>i</a:t>
               </a:r>
               <a:r>
-                <a:rPr lang="ko" sz="1000" b="0" i="0" u="none" strike="noStrike" cap="none">
+                <a:rPr lang="ko" sz="1000" b="0" i="0" u="none" strike="noStrike" cap="none" dirty="0">
                   <a:solidFill>
                     <a:srgbClr val="232F3E"/>
                   </a:solidFill>
@@ -7687,7 +10668,7 @@
                 </a:rPr>
                 <a:t>nstance</a:t>
               </a:r>
-              <a:endParaRPr sz="1300"/>
+              <a:endParaRPr sz="1300" dirty="0"/>
             </a:p>
           </p:txBody>
         </p:sp>
@@ -7819,7 +10800,7 @@
               </a:rPr>
               <a:t>Amazon EventBridge</a:t>
             </a:r>
-            <a:endParaRPr sz="1200"/>
+            <a:endParaRPr sz="1200" dirty="0"/>
           </a:p>
         </p:txBody>
       </p:sp>
@@ -7906,7 +10887,7 @@
                 </a:rPr>
                 <a:t>Bastion</a:t>
               </a:r>
-              <a:endParaRPr sz="1000">
+              <a:endParaRPr sz="1000" dirty="0">
                 <a:solidFill>
                   <a:srgbClr val="232F3E"/>
                 </a:solidFill>
@@ -7942,7 +10923,7 @@
                 </a:rPr>
                 <a:t>nstance</a:t>
               </a:r>
-              <a:endParaRPr sz="1300"/>
+              <a:endParaRPr sz="1300" dirty="0"/>
             </a:p>
           </p:txBody>
         </p:sp>
@@ -7987,7 +10968,7 @@
               </a:spcAft>
               <a:buNone/>
             </a:pPr>
-            <a:endParaRPr sz="1200" b="0" i="0" u="none" strike="noStrike" cap="none">
+            <a:endParaRPr sz="1200" b="0" i="0" u="none" strike="noStrike" cap="none" dirty="0">
               <a:solidFill>
                 <a:srgbClr val="D86613"/>
               </a:solidFill>
@@ -8007,7 +10988,7 @@
               </a:spcAft>
               <a:buNone/>
             </a:pPr>
-            <a:endParaRPr sz="1200">
+            <a:endParaRPr sz="1200" dirty="0">
               <a:solidFill>
                 <a:srgbClr val="D86613"/>
               </a:solidFill>
@@ -8035,7 +11016,7 @@
               </a:rPr>
               <a:t>Auto Scaling</a:t>
             </a:r>
-            <a:endParaRPr sz="1000">
+            <a:endParaRPr sz="1000" dirty="0">
               <a:solidFill>
                 <a:srgbClr val="D86613"/>
               </a:solidFill>
@@ -8063,7 +11044,7 @@
               </a:rPr>
               <a:t>group</a:t>
             </a:r>
-            <a:endParaRPr sz="1200"/>
+            <a:endParaRPr sz="1200" dirty="0"/>
           </a:p>
         </p:txBody>
       </p:sp>
@@ -8207,7 +11188,7 @@
                 </a:rPr>
                 <a:t>Amazon S3</a:t>
               </a:r>
-              <a:endParaRPr sz="1000"/>
+              <a:endParaRPr sz="1000" dirty="0"/>
             </a:p>
           </p:txBody>
         </p:sp>

</xml_diff>